<commit_message>
added photos and fixed pptx
</commit_message>
<xml_diff>
--- a/class-guide.pptx
+++ b/class-guide.pptx
@@ -5,10 +5,10 @@
     <p:sldMasterId id="2147483678" r:id="rId1"/>
   </p:sldMasterIdLst>
   <p:notesMasterIdLst>
-    <p:notesMasterId r:id="rId12"/>
+    <p:notesMasterId r:id="rId13"/>
   </p:notesMasterIdLst>
   <p:handoutMasterIdLst>
-    <p:handoutMasterId r:id="rId13"/>
+    <p:handoutMasterId r:id="rId14"/>
   </p:handoutMasterIdLst>
   <p:sldIdLst>
     <p:sldId id="494" r:id="rId2"/>
@@ -21,6 +21,7 @@
     <p:sldId id="517" r:id="rId9"/>
     <p:sldId id="519" r:id="rId10"/>
     <p:sldId id="520" r:id="rId11"/>
+    <p:sldId id="521" r:id="rId12"/>
   </p:sldIdLst>
   <p:sldSz cx="12192000" cy="6858000"/>
   <p:notesSz cx="6858000" cy="9144000"/>
@@ -3815,7 +3816,7 @@
           <a:graphicData uri="http://schemas.openxmlformats.org/presentationml/2006/ole">
             <mc:AlternateContent xmlns:mc="http://schemas.openxmlformats.org/markup-compatibility/2006">
               <mc:Choice xmlns:v="urn:schemas-microsoft-com:vml" Requires="v">
-                <p:oleObj spid="_x0000_s2167" name="think-cell Slide" r:id="rId4" imgW="270" imgH="270" progId="TCLayout.ActiveDocument.1">
+                <p:oleObj spid="_x0000_s2168" name="think-cell Slide" r:id="rId4" imgW="270" imgH="270" progId="TCLayout.ActiveDocument.1">
                   <p:embed/>
                 </p:oleObj>
               </mc:Choice>
@@ -7105,6 +7106,119 @@
     <p:extLst>
       <p:ext uri="{BB962C8B-B14F-4D97-AF65-F5344CB8AC3E}">
         <p14:creationId xmlns:p14="http://schemas.microsoft.com/office/powerpoint/2010/main" val="2850825567"/>
+      </p:ext>
+    </p:extLst>
+  </p:cSld>
+  <p:clrMapOvr>
+    <a:masterClrMapping/>
+  </p:clrMapOvr>
+</p:sld>
+</file>
+
+<file path=ppt/slides/slide11.xml><?xml version="1.0" encoding="utf-8"?>
+<p:sld xmlns:a="http://schemas.openxmlformats.org/drawingml/2006/main" xmlns:r="http://schemas.openxmlformats.org/officeDocument/2006/relationships" xmlns:p="http://schemas.openxmlformats.org/presentationml/2006/main">
+  <p:cSld>
+    <p:spTree>
+      <p:nvGrpSpPr>
+        <p:cNvPr id="1" name=""/>
+        <p:cNvGrpSpPr/>
+        <p:nvPr/>
+      </p:nvGrpSpPr>
+      <p:grpSpPr>
+        <a:xfrm>
+          <a:off x="0" y="0"/>
+          <a:ext cx="0" cy="0"/>
+          <a:chOff x="0" y="0"/>
+          <a:chExt cx="0" cy="0"/>
+        </a:xfrm>
+      </p:grpSpPr>
+      <p:sp>
+        <p:nvSpPr>
+          <p:cNvPr id="2" name="Title 1">
+            <a:extLst>
+              <a:ext uri="{FF2B5EF4-FFF2-40B4-BE49-F238E27FC236}">
+                <a16:creationId xmlns:a16="http://schemas.microsoft.com/office/drawing/2014/main" id="{F38AA60E-F1A4-B341-8418-AA355E912D67}"/>
+              </a:ext>
+            </a:extLst>
+          </p:cNvPr>
+          <p:cNvSpPr>
+            <a:spLocks noGrp="1"/>
+          </p:cNvSpPr>
+          <p:nvPr>
+            <p:ph type="title"/>
+          </p:nvPr>
+        </p:nvSpPr>
+        <p:spPr/>
+        <p:txBody>
+          <a:bodyPr/>
+          <a:lstStyle/>
+          <a:p>
+            <a:r>
+              <a:rPr lang="en-US" dirty="0"/>
+              <a:t>Tactical Switches</a:t>
+            </a:r>
+          </a:p>
+        </p:txBody>
+      </p:sp>
+      <p:sp>
+        <p:nvSpPr>
+          <p:cNvPr id="3" name="Content Placeholder 2">
+            <a:extLst>
+              <a:ext uri="{FF2B5EF4-FFF2-40B4-BE49-F238E27FC236}">
+                <a16:creationId xmlns:a16="http://schemas.microsoft.com/office/drawing/2014/main" id="{15AF0856-CD6C-F546-AFC9-359BAA15E7AE}"/>
+              </a:ext>
+            </a:extLst>
+          </p:cNvPr>
+          <p:cNvSpPr>
+            <a:spLocks noGrp="1"/>
+          </p:cNvSpPr>
+          <p:nvPr>
+            <p:ph idx="1"/>
+          </p:nvPr>
+        </p:nvSpPr>
+        <p:spPr/>
+        <p:txBody>
+          <a:bodyPr/>
+          <a:lstStyle/>
+          <a:p>
+            <a:endParaRPr lang="en-US" dirty="0"/>
+          </a:p>
+        </p:txBody>
+      </p:sp>
+      <p:pic>
+        <p:nvPicPr>
+          <p:cNvPr id="4" name="Picture 3">
+            <a:extLst>
+              <a:ext uri="{FF2B5EF4-FFF2-40B4-BE49-F238E27FC236}">
+                <a16:creationId xmlns:a16="http://schemas.microsoft.com/office/drawing/2014/main" id="{8BB03EA0-A71F-AC4A-AB6F-D0574ED68F13}"/>
+              </a:ext>
+            </a:extLst>
+          </p:cNvPr>
+          <p:cNvPicPr>
+            <a:picLocks noChangeAspect="1"/>
+          </p:cNvPicPr>
+          <p:nvPr/>
+        </p:nvPicPr>
+        <p:blipFill>
+          <a:blip r:embed="rId2"/>
+          <a:stretch>
+            <a:fillRect/>
+          </a:stretch>
+        </p:blipFill>
+        <p:spPr>
+          <a:xfrm>
+            <a:off x="695457" y="2377437"/>
+            <a:ext cx="9481670" cy="2467832"/>
+          </a:xfrm>
+          <a:prstGeom prst="rect">
+            <a:avLst/>
+          </a:prstGeom>
+        </p:spPr>
+      </p:pic>
+    </p:spTree>
+    <p:extLst>
+      <p:ext uri="{BB962C8B-B14F-4D97-AF65-F5344CB8AC3E}">
+        <p14:creationId xmlns:p14="http://schemas.microsoft.com/office/powerpoint/2010/main" val="2157600442"/>
       </p:ext>
     </p:extLst>
   </p:cSld>

</xml_diff>

<commit_message>
updated the slides for the lab tonight
Don't you just love when slides are updated?
</commit_message>
<xml_diff>
--- a/class-guide.pptx
+++ b/class-guide.pptx
@@ -5,10 +5,10 @@
     <p:sldMasterId id="2147483678" r:id="rId1"/>
   </p:sldMasterIdLst>
   <p:notesMasterIdLst>
-    <p:notesMasterId r:id="rId21"/>
+    <p:notesMasterId r:id="rId20"/>
   </p:notesMasterIdLst>
   <p:handoutMasterIdLst>
-    <p:handoutMasterId r:id="rId22"/>
+    <p:handoutMasterId r:id="rId21"/>
   </p:handoutMasterIdLst>
   <p:sldIdLst>
     <p:sldId id="494" r:id="rId2"/>
@@ -18,18 +18,17 @@
     <p:sldId id="527" r:id="rId6"/>
     <p:sldId id="528" r:id="rId7"/>
     <p:sldId id="511" r:id="rId8"/>
-    <p:sldId id="524" r:id="rId9"/>
-    <p:sldId id="513" r:id="rId10"/>
-    <p:sldId id="514" r:id="rId11"/>
-    <p:sldId id="515" r:id="rId12"/>
-    <p:sldId id="516" r:id="rId13"/>
-    <p:sldId id="518" r:id="rId14"/>
-    <p:sldId id="517" r:id="rId15"/>
-    <p:sldId id="519" r:id="rId16"/>
-    <p:sldId id="520" r:id="rId17"/>
-    <p:sldId id="521" r:id="rId18"/>
-    <p:sldId id="522" r:id="rId19"/>
-    <p:sldId id="529" r:id="rId20"/>
+    <p:sldId id="513" r:id="rId9"/>
+    <p:sldId id="514" r:id="rId10"/>
+    <p:sldId id="515" r:id="rId11"/>
+    <p:sldId id="516" r:id="rId12"/>
+    <p:sldId id="518" r:id="rId13"/>
+    <p:sldId id="517" r:id="rId14"/>
+    <p:sldId id="519" r:id="rId15"/>
+    <p:sldId id="520" r:id="rId16"/>
+    <p:sldId id="521" r:id="rId17"/>
+    <p:sldId id="522" r:id="rId18"/>
+    <p:sldId id="529" r:id="rId19"/>
   </p:sldIdLst>
   <p:sldSz cx="12192000" cy="6858000"/>
   <p:notesSz cx="6858000" cy="9144000"/>
@@ -253,7 +252,7 @@
           <a:p>
             <a:fld id="{FCBF77B6-06AB-43A3-89A4-8CD1677993D0}" type="datetimeFigureOut">
               <a:rPr lang="en-CA" smtClean="0"/>
-              <a:t>2018-03-07</a:t>
+              <a:t>2018-09-19</a:t>
             </a:fld>
             <a:endParaRPr lang="en-CA"/>
           </a:p>
@@ -460,7 +459,7 @@
           <a:p>
             <a:fld id="{9B6804B0-AD37-4623-8498-3C9AE39E25E5}" type="datetimeFigureOut">
               <a:rPr lang="en-CA" smtClean="0"/>
-              <a:t>2018-03-07</a:t>
+              <a:t>2018-09-19</a:t>
             </a:fld>
             <a:endParaRPr lang="en-CA"/>
           </a:p>
@@ -3824,7 +3823,7 @@
           <a:graphicData uri="http://schemas.openxmlformats.org/presentationml/2006/ole">
             <mc:AlternateContent xmlns:mc="http://schemas.openxmlformats.org/markup-compatibility/2006">
               <mc:Choice xmlns:v="urn:schemas-microsoft-com:vml" Requires="v">
-                <p:oleObj spid="_x0000_s2176" name="think-cell Slide" r:id="rId4" imgW="270" imgH="270" progId="TCLayout.ActiveDocument.1">
+                <p:oleObj spid="_x0000_s2181" name="think-cell Slide" r:id="rId4" imgW="270" imgH="270" progId="TCLayout.ActiveDocument.1">
                   <p:embed/>
                 </p:oleObj>
               </mc:Choice>
@@ -7041,150 +7040,6 @@
       </p:grpSpPr>
       <p:sp>
         <p:nvSpPr>
-          <p:cNvPr id="2" name="Title 1"/>
-          <p:cNvSpPr>
-            <a:spLocks noGrp="1"/>
-          </p:cNvSpPr>
-          <p:nvPr>
-            <p:ph type="title"/>
-          </p:nvPr>
-        </p:nvSpPr>
-        <p:spPr/>
-        <p:txBody>
-          <a:bodyPr/>
-          <a:lstStyle/>
-          <a:p>
-            <a:r>
-              <a:rPr lang="en-US" dirty="0"/>
-              <a:t>Test your board</a:t>
-            </a:r>
-          </a:p>
-        </p:txBody>
-      </p:sp>
-      <p:sp>
-        <p:nvSpPr>
-          <p:cNvPr id="3" name="Content Placeholder 2"/>
-          <p:cNvSpPr>
-            <a:spLocks noGrp="1"/>
-          </p:cNvSpPr>
-          <p:nvPr>
-            <p:ph idx="1"/>
-          </p:nvPr>
-        </p:nvSpPr>
-        <p:spPr/>
-        <p:txBody>
-          <a:bodyPr/>
-          <a:lstStyle/>
-          <a:p>
-            <a:r>
-              <a:rPr lang="en-US" sz="2400" dirty="0"/>
-              <a:t>Open the Arduino IDE</a:t>
-            </a:r>
-          </a:p>
-          <a:p>
-            <a:r>
-              <a:rPr lang="en-US" sz="2400" dirty="0"/>
-              <a:t>Select Tools, Click Board -&gt; Arduino Nano</a:t>
-            </a:r>
-          </a:p>
-          <a:p>
-            <a:r>
-              <a:rPr lang="en-US" sz="2400" dirty="0"/>
-              <a:t>Take note of the current devices under Tools -&gt; Port (write down so you don’t select them later)</a:t>
-            </a:r>
-          </a:p>
-          <a:p>
-            <a:r>
-              <a:rPr lang="en-US" sz="2400" dirty="0"/>
-              <a:t>Plug your Arduino in, wait about 20 seconds, and then check under Tools -&gt; Port.  </a:t>
-            </a:r>
-          </a:p>
-          <a:p>
-            <a:pPr marL="534924" lvl="3" indent="-342900"/>
-            <a:r>
-              <a:rPr lang="en-US" b="1" dirty="0"/>
-              <a:t>	</a:t>
-            </a:r>
-            <a:r>
-              <a:rPr lang="en-US" dirty="0"/>
-              <a:t>Windows – should show as a COM# device</a:t>
-            </a:r>
-          </a:p>
-          <a:p>
-            <a:pPr marL="534924" lvl="3" indent="-342900"/>
-            <a:r>
-              <a:rPr lang="en-US" dirty="0"/>
-              <a:t>	Mac Users – check the file called “</a:t>
-            </a:r>
-            <a:r>
-              <a:rPr lang="en-US" dirty="0" err="1"/>
-              <a:t>mac_help.txt</a:t>
-            </a:r>
-            <a:r>
-              <a:rPr lang="en-US" dirty="0"/>
-              <a:t>” in the repo.</a:t>
-            </a:r>
-          </a:p>
-          <a:p>
-            <a:r>
-              <a:rPr lang="en-US" sz="2400" dirty="0"/>
-              <a:t>Open the file </a:t>
-            </a:r>
-            <a:r>
-              <a:rPr lang="en-US" sz="2400" dirty="0" err="1"/>
-              <a:t>helloworld</a:t>
-            </a:r>
-            <a:r>
-              <a:rPr lang="en-US" sz="2400" dirty="0"/>
-              <a:t>/</a:t>
-            </a:r>
-            <a:r>
-              <a:rPr lang="en-US" sz="2400" dirty="0" err="1"/>
-              <a:t>helloworld.ino</a:t>
-            </a:r>
-            <a:r>
-              <a:rPr lang="en-US" sz="2400" dirty="0"/>
-              <a:t> and click the run button in Arduino</a:t>
-            </a:r>
-          </a:p>
-          <a:p>
-            <a:pPr lvl="1"/>
-            <a:endParaRPr lang="en-US" sz="2400" dirty="0"/>
-          </a:p>
-        </p:txBody>
-      </p:sp>
-    </p:spTree>
-    <p:extLst>
-      <p:ext uri="{BB962C8B-B14F-4D97-AF65-F5344CB8AC3E}">
-        <p14:creationId xmlns:p14="http://schemas.microsoft.com/office/powerpoint/2010/main" val="2066430322"/>
-      </p:ext>
-    </p:extLst>
-  </p:cSld>
-  <p:clrMapOvr>
-    <a:masterClrMapping/>
-  </p:clrMapOvr>
-</p:sld>
-</file>
-
-<file path=ppt/slides/slide11.xml><?xml version="1.0" encoding="utf-8"?>
-<p:sld xmlns:a="http://schemas.openxmlformats.org/drawingml/2006/main" xmlns:r="http://schemas.openxmlformats.org/officeDocument/2006/relationships" xmlns:p="http://schemas.openxmlformats.org/presentationml/2006/main">
-  <p:cSld>
-    <p:spTree>
-      <p:nvGrpSpPr>
-        <p:cNvPr id="1" name=""/>
-        <p:cNvGrpSpPr/>
-        <p:nvPr/>
-      </p:nvGrpSpPr>
-      <p:grpSpPr>
-        <a:xfrm>
-          <a:off x="0" y="0"/>
-          <a:ext cx="0" cy="0"/>
-          <a:chOff x="0" y="0"/>
-          <a:chExt cx="0" cy="0"/>
-        </a:xfrm>
-      </p:grpSpPr>
-      <p:sp>
-        <p:nvSpPr>
           <p:cNvPr id="2" name="Title 1">
             <a:extLst>
               <a:ext uri="{FF2B5EF4-FFF2-40B4-BE49-F238E27FC236}">
@@ -7243,7 +7098,7 @@
             </a:r>
             <a:r>
               <a:rPr lang="en-US" dirty="0"/>
-              <a:t> running, you should be able to type a character and have your Arduino respond.  If it doesn’t, please see us before we continue!</a:t>
+              <a:t> running, you should be able to type a character and have your Arduino respond.  If it doesn’t, please see me before we continue!</a:t>
             </a:r>
           </a:p>
           <a:p>
@@ -7267,7 +7122,7 @@
 </p:sld>
 </file>
 
-<file path=ppt/slides/slide12.xml><?xml version="1.0" encoding="utf-8"?>
+<file path=ppt/slides/slide11.xml><?xml version="1.0" encoding="utf-8"?>
 <p:sld xmlns:a="http://schemas.openxmlformats.org/drawingml/2006/main" xmlns:r="http://schemas.openxmlformats.org/officeDocument/2006/relationships" xmlns:p="http://schemas.openxmlformats.org/presentationml/2006/main">
   <p:cSld>
     <p:spTree>
@@ -7360,7 +7215,7 @@
 </p:sld>
 </file>
 
-<file path=ppt/slides/slide13.xml><?xml version="1.0" encoding="utf-8"?>
+<file path=ppt/slides/slide12.xml><?xml version="1.0" encoding="utf-8"?>
 <p:sld xmlns:a="http://schemas.openxmlformats.org/drawingml/2006/main" xmlns:r="http://schemas.openxmlformats.org/officeDocument/2006/relationships" xmlns:p="http://schemas.openxmlformats.org/presentationml/2006/main">
   <p:cSld>
     <p:spTree>
@@ -7453,7 +7308,7 @@
 </p:sld>
 </file>
 
-<file path=ppt/slides/slide14.xml><?xml version="1.0" encoding="utf-8"?>
+<file path=ppt/slides/slide13.xml><?xml version="1.0" encoding="utf-8"?>
 <p:sld xmlns:a="http://schemas.openxmlformats.org/drawingml/2006/main" xmlns:r="http://schemas.openxmlformats.org/officeDocument/2006/relationships" xmlns:p="http://schemas.openxmlformats.org/presentationml/2006/main">
   <p:cSld>
     <p:spTree>
@@ -7572,7 +7427,7 @@
 </p:sld>
 </file>
 
-<file path=ppt/slides/slide15.xml><?xml version="1.0" encoding="utf-8"?>
+<file path=ppt/slides/slide14.xml><?xml version="1.0" encoding="utf-8"?>
 <p:sld xmlns:a="http://schemas.openxmlformats.org/drawingml/2006/main" xmlns:r="http://schemas.openxmlformats.org/officeDocument/2006/relationships" xmlns:p="http://schemas.openxmlformats.org/presentationml/2006/main">
   <p:cSld>
     <p:spTree>
@@ -8038,7 +7893,7 @@
 </p:sld>
 </file>
 
-<file path=ppt/slides/slide16.xml><?xml version="1.0" encoding="utf-8"?>
+<file path=ppt/slides/slide15.xml><?xml version="1.0" encoding="utf-8"?>
 <p:sld xmlns:a="http://schemas.openxmlformats.org/drawingml/2006/main" xmlns:r="http://schemas.openxmlformats.org/officeDocument/2006/relationships" xmlns:p="http://schemas.openxmlformats.org/presentationml/2006/main">
   <p:cSld>
     <p:spTree>
@@ -8139,7 +7994,7 @@
 </p:sld>
 </file>
 
-<file path=ppt/slides/slide17.xml><?xml version="1.0" encoding="utf-8"?>
+<file path=ppt/slides/slide16.xml><?xml version="1.0" encoding="utf-8"?>
 <p:sld xmlns:a="http://schemas.openxmlformats.org/drawingml/2006/main" xmlns:r="http://schemas.openxmlformats.org/officeDocument/2006/relationships" xmlns:p="http://schemas.openxmlformats.org/presentationml/2006/main">
   <p:cSld>
     <p:spTree>
@@ -8252,7 +8107,7 @@
 </p:sld>
 </file>
 
-<file path=ppt/slides/slide18.xml><?xml version="1.0" encoding="utf-8"?>
+<file path=ppt/slides/slide17.xml><?xml version="1.0" encoding="utf-8"?>
 <p:sld xmlns:a="http://schemas.openxmlformats.org/drawingml/2006/main" xmlns:r="http://schemas.openxmlformats.org/officeDocument/2006/relationships" xmlns:p="http://schemas.openxmlformats.org/presentationml/2006/main">
   <p:cSld>
     <p:spTree>
@@ -8360,7 +8215,7 @@
 </p:sld>
 </file>
 
-<file path=ppt/slides/slide19.xml><?xml version="1.0" encoding="utf-8"?>
+<file path=ppt/slides/slide18.xml><?xml version="1.0" encoding="utf-8"?>
 <p:sld xmlns:a="http://schemas.openxmlformats.org/drawingml/2006/main" xmlns:r="http://schemas.openxmlformats.org/officeDocument/2006/relationships" xmlns:p="http://schemas.openxmlformats.org/presentationml/2006/main">
   <p:cSld>
     <p:spTree>
@@ -9358,18 +9213,12 @@
       </p:grpSpPr>
       <p:sp>
         <p:nvSpPr>
-          <p:cNvPr id="2" name="Slide Number Placeholder 1">
-            <a:extLst>
-              <a:ext uri="{FF2B5EF4-FFF2-40B4-BE49-F238E27FC236}">
-                <a16:creationId xmlns:a16="http://schemas.microsoft.com/office/drawing/2014/main" id="{1571A6A9-0EC5-4D1F-8684-F62A7E13C7BA}"/>
-              </a:ext>
-            </a:extLst>
-          </p:cNvPr>
+          <p:cNvPr id="2" name="Title 1"/>
           <p:cNvSpPr>
             <a:spLocks noGrp="1"/>
           </p:cNvSpPr>
           <p:nvPr>
-            <p:ph type="sldNum" sz="quarter" idx="12"/>
+            <p:ph type="title"/>
           </p:nvPr>
         </p:nvSpPr>
         <p:spPr/>
@@ -9377,18 +9226,89 @@
           <a:bodyPr/>
           <a:lstStyle/>
           <a:p>
-            <a:fld id="{00E6A5BD-C011-4A45-AA3A-201790FB7F2B}" type="slidenum">
-              <a:rPr lang="en-CA" smtClean="0"/>
-              <a:t>8</a:t>
-            </a:fld>
-            <a:endParaRPr lang="en-CA"/>
+            <a:r>
+              <a:rPr lang="en-US" dirty="0"/>
+              <a:t>Please Pick Up</a:t>
+            </a:r>
+          </a:p>
+        </p:txBody>
+      </p:sp>
+      <p:sp>
+        <p:nvSpPr>
+          <p:cNvPr id="3" name="Content Placeholder 2"/>
+          <p:cNvSpPr>
+            <a:spLocks noGrp="1"/>
+          </p:cNvSpPr>
+          <p:nvPr>
+            <p:ph idx="1"/>
+          </p:nvPr>
+        </p:nvSpPr>
+        <p:spPr>
+          <a:xfrm>
+            <a:off x="533400" y="1136486"/>
+            <a:ext cx="10132616" cy="4837973"/>
+          </a:xfrm>
+        </p:spPr>
+        <p:txBody>
+          <a:bodyPr/>
+          <a:lstStyle/>
+          <a:p>
+            <a:r>
+              <a:rPr lang="en-US" sz="2400" dirty="0"/>
+              <a:t>8 male to female jumper cables</a:t>
+            </a:r>
+          </a:p>
+          <a:p>
+            <a:r>
+              <a:rPr lang="en-US" sz="2400" dirty="0"/>
+              <a:t>10 male to male jumper cables</a:t>
+            </a:r>
+          </a:p>
+          <a:p>
+            <a:r>
+              <a:rPr lang="en-US" sz="2400" dirty="0"/>
+              <a:t>10 µf electrolytic capacitor</a:t>
+            </a:r>
+          </a:p>
+          <a:p>
+            <a:r>
+              <a:rPr lang="en-US" sz="2400" dirty="0"/>
+              <a:t>1x NRF24L01+ Transceiver</a:t>
+            </a:r>
+          </a:p>
+          <a:p>
+            <a:r>
+              <a:rPr lang="en-US" sz="2400" dirty="0"/>
+              <a:t>4 tactical buttons</a:t>
+            </a:r>
+          </a:p>
+          <a:p>
+            <a:r>
+              <a:rPr lang="en-US" sz="2400" dirty="0"/>
+              <a:t>Arduino</a:t>
+            </a:r>
+          </a:p>
+          <a:p>
+            <a:r>
+              <a:rPr lang="en-US" sz="2400" dirty="0"/>
+              <a:t>Breadboard</a:t>
+            </a:r>
+          </a:p>
+          <a:p>
+            <a:r>
+              <a:rPr lang="en-US" sz="2400" dirty="0"/>
+              <a:t>USB Cable</a:t>
+            </a:r>
+          </a:p>
+          <a:p>
+            <a:endParaRPr lang="en-US" sz="2400" dirty="0"/>
           </a:p>
         </p:txBody>
       </p:sp>
     </p:spTree>
     <p:extLst>
       <p:ext uri="{BB962C8B-B14F-4D97-AF65-F5344CB8AC3E}">
-        <p14:creationId xmlns:p14="http://schemas.microsoft.com/office/powerpoint/2010/main" val="2758730124"/>
+        <p14:creationId xmlns:p14="http://schemas.microsoft.com/office/powerpoint/2010/main" val="1350419827"/>
       </p:ext>
     </p:extLst>
   </p:cSld>
@@ -9432,7 +9352,7 @@
           <a:p>
             <a:r>
               <a:rPr lang="en-US" dirty="0"/>
-              <a:t>Please Pick Up</a:t>
+              <a:t>Test your board</a:t>
             </a:r>
           </a:p>
         </p:txBody>
@@ -9447,68 +9367,84 @@
             <p:ph idx="1"/>
           </p:nvPr>
         </p:nvSpPr>
-        <p:spPr>
-          <a:xfrm>
-            <a:off x="533400" y="1136486"/>
-            <a:ext cx="10132616" cy="4837973"/>
-          </a:xfrm>
-        </p:spPr>
+        <p:spPr/>
         <p:txBody>
           <a:bodyPr/>
           <a:lstStyle/>
           <a:p>
             <a:r>
               <a:rPr lang="en-US" sz="2400" dirty="0"/>
-              <a:t>16 male to female jumper cables (different colors if possible).</a:t>
+              <a:t>Open the Arduino IDE</a:t>
             </a:r>
           </a:p>
           <a:p>
             <a:r>
               <a:rPr lang="en-US" sz="2400" dirty="0"/>
-              <a:t>16 male to male jumper cables (different colors if possible).</a:t>
-            </a:r>
-          </a:p>
-          <a:p>
-            <a:r>
-              <a:rPr lang="en-US" sz="2400"/>
-              <a:t>Four </a:t>
-            </a:r>
+              <a:t>Select Tools, Click Board -&gt; Arduino Nano</a:t>
+            </a:r>
+          </a:p>
+          <a:p>
             <a:r>
               <a:rPr lang="en-US" sz="2400" dirty="0"/>
-              <a:t>pieces of electrical tape (1 x ~3 inches, 3 x 1 inch)</a:t>
+              <a:t>Take note of the current devices under Tools -&gt; Port (write down so you don’t select them later)</a:t>
             </a:r>
           </a:p>
           <a:p>
             <a:r>
               <a:rPr lang="en-US" sz="2400" dirty="0"/>
-              <a:t>Four AA Batteries</a:t>
+              <a:t>Plug your Arduino in, wait about 20 seconds, and then check under Tools -&gt; Port.  </a:t>
+            </a:r>
+          </a:p>
+          <a:p>
+            <a:pPr marL="534924" lvl="3" indent="-342900"/>
+            <a:r>
+              <a:rPr lang="en-US" b="1" dirty="0"/>
+              <a:t>	</a:t>
+            </a:r>
+            <a:r>
+              <a:rPr lang="en-US" dirty="0"/>
+              <a:t>Windows – should show as a COM# device</a:t>
+            </a:r>
+          </a:p>
+          <a:p>
+            <a:pPr marL="534924" lvl="3" indent="-342900"/>
+            <a:r>
+              <a:rPr lang="en-US" dirty="0"/>
+              <a:t>	Mac Users – check the file called “</a:t>
+            </a:r>
+            <a:r>
+              <a:rPr lang="en-US" dirty="0" err="1"/>
+              <a:t>mac_help.txt</a:t>
+            </a:r>
+            <a:r>
+              <a:rPr lang="en-US" dirty="0"/>
+              <a:t>” in the repo.</a:t>
             </a:r>
           </a:p>
           <a:p>
             <a:r>
               <a:rPr lang="en-US" sz="2400" dirty="0"/>
-              <a:t>10 µf electrolytic capacitor</a:t>
-            </a:r>
-          </a:p>
-          <a:p>
+              <a:t>Open the file </a:t>
+            </a:r>
+            <a:r>
+              <a:rPr lang="en-US" sz="2400" dirty="0" err="1"/>
+              <a:t>helloworld</a:t>
+            </a:r>
             <a:r>
               <a:rPr lang="en-US" sz="2400" dirty="0"/>
-              <a:t>1x NRF24L01+ Transceiver</a:t>
-            </a:r>
-          </a:p>
-          <a:p>
+              <a:t>/</a:t>
+            </a:r>
+            <a:r>
+              <a:rPr lang="en-US" sz="2400" dirty="0" err="1"/>
+              <a:t>helloworld.ino</a:t>
+            </a:r>
             <a:r>
               <a:rPr lang="en-US" sz="2400" dirty="0"/>
-              <a:t>4 tactical buttons</a:t>
-            </a:r>
-          </a:p>
-          <a:p>
-            <a:r>
-              <a:rPr lang="en-US" sz="2400" dirty="0"/>
-              <a:t>Ziploc bag with Arduino, Breadboard, Battery Holder, USB Cable</a:t>
-            </a:r>
-          </a:p>
-          <a:p>
+              <a:t> and click the run button in Arduino</a:t>
+            </a:r>
+          </a:p>
+          <a:p>
+            <a:pPr lvl="1"/>
             <a:endParaRPr lang="en-US" sz="2400" dirty="0"/>
           </a:p>
         </p:txBody>
@@ -9516,7 +9452,7 @@
     </p:spTree>
     <p:extLst>
       <p:ext uri="{BB962C8B-B14F-4D97-AF65-F5344CB8AC3E}">
-        <p14:creationId xmlns:p14="http://schemas.microsoft.com/office/powerpoint/2010/main" val="1350419827"/>
+        <p14:creationId xmlns:p14="http://schemas.microsoft.com/office/powerpoint/2010/main" val="2066430322"/>
       </p:ext>
     </p:extLst>
   </p:cSld>

</xml_diff>

<commit_message>
Added introduction slide for yours truly
</commit_message>
<xml_diff>
--- a/class-guide.pptx
+++ b/class-guide.pptx
@@ -5,10 +5,10 @@
     <p:sldMasterId id="2147483678" r:id="rId1"/>
   </p:sldMasterIdLst>
   <p:notesMasterIdLst>
-    <p:notesMasterId r:id="rId28"/>
+    <p:notesMasterId r:id="rId29"/>
   </p:notesMasterIdLst>
   <p:handoutMasterIdLst>
-    <p:handoutMasterId r:id="rId29"/>
+    <p:handoutMasterId r:id="rId30"/>
   </p:handoutMasterIdLst>
   <p:sldIdLst>
     <p:sldId id="494" r:id="rId2"/>
@@ -17,26 +17,27 @@
     <p:sldId id="526" r:id="rId5"/>
     <p:sldId id="527" r:id="rId6"/>
     <p:sldId id="528" r:id="rId7"/>
-    <p:sldId id="511" r:id="rId8"/>
-    <p:sldId id="513" r:id="rId9"/>
-    <p:sldId id="514" r:id="rId10"/>
-    <p:sldId id="515" r:id="rId11"/>
-    <p:sldId id="516" r:id="rId12"/>
-    <p:sldId id="518" r:id="rId13"/>
-    <p:sldId id="517" r:id="rId14"/>
-    <p:sldId id="519" r:id="rId15"/>
-    <p:sldId id="520" r:id="rId16"/>
-    <p:sldId id="521" r:id="rId17"/>
-    <p:sldId id="522" r:id="rId18"/>
-    <p:sldId id="529" r:id="rId19"/>
-    <p:sldId id="537" r:id="rId20"/>
-    <p:sldId id="536" r:id="rId21"/>
-    <p:sldId id="530" r:id="rId22"/>
-    <p:sldId id="531" r:id="rId23"/>
-    <p:sldId id="532" r:id="rId24"/>
-    <p:sldId id="533" r:id="rId25"/>
-    <p:sldId id="534" r:id="rId26"/>
-    <p:sldId id="535" r:id="rId27"/>
+    <p:sldId id="538" r:id="rId8"/>
+    <p:sldId id="511" r:id="rId9"/>
+    <p:sldId id="513" r:id="rId10"/>
+    <p:sldId id="514" r:id="rId11"/>
+    <p:sldId id="515" r:id="rId12"/>
+    <p:sldId id="516" r:id="rId13"/>
+    <p:sldId id="518" r:id="rId14"/>
+    <p:sldId id="517" r:id="rId15"/>
+    <p:sldId id="519" r:id="rId16"/>
+    <p:sldId id="520" r:id="rId17"/>
+    <p:sldId id="521" r:id="rId18"/>
+    <p:sldId id="522" r:id="rId19"/>
+    <p:sldId id="529" r:id="rId20"/>
+    <p:sldId id="537" r:id="rId21"/>
+    <p:sldId id="536" r:id="rId22"/>
+    <p:sldId id="530" r:id="rId23"/>
+    <p:sldId id="531" r:id="rId24"/>
+    <p:sldId id="532" r:id="rId25"/>
+    <p:sldId id="533" r:id="rId26"/>
+    <p:sldId id="534" r:id="rId27"/>
+    <p:sldId id="535" r:id="rId28"/>
   </p:sldIdLst>
   <p:sldSz cx="12192000" cy="6858000"/>
   <p:notesSz cx="6858000" cy="9144000"/>
@@ -260,7 +261,7 @@
           <a:p>
             <a:fld id="{FCBF77B6-06AB-43A3-89A4-8CD1677993D0}" type="datetimeFigureOut">
               <a:rPr lang="en-CA" smtClean="0"/>
-              <a:t>2018-09-24</a:t>
+              <a:t>2019-02-20</a:t>
             </a:fld>
             <a:endParaRPr lang="en-CA"/>
           </a:p>
@@ -467,7 +468,7 @@
           <a:p>
             <a:fld id="{9B6804B0-AD37-4623-8498-3C9AE39E25E5}" type="datetimeFigureOut">
               <a:rPr lang="en-CA" smtClean="0"/>
-              <a:t>2018-09-24</a:t>
+              <a:t>2019-02-20</a:t>
             </a:fld>
             <a:endParaRPr lang="en-CA"/>
           </a:p>
@@ -852,6 +853,90 @@
     <p:extLst>
       <p:ext uri="{BB962C8B-B14F-4D97-AF65-F5344CB8AC3E}">
         <p14:creationId xmlns:p14="http://schemas.microsoft.com/office/powerpoint/2010/main" val="1716635801"/>
+      </p:ext>
+    </p:extLst>
+  </p:cSld>
+  <p:clrMapOvr>
+    <a:masterClrMapping/>
+  </p:clrMapOvr>
+</p:notes>
+</file>
+
+<file path=ppt/notesSlides/notesSlide2.xml><?xml version="1.0" encoding="utf-8"?>
+<p:notes xmlns:a="http://schemas.openxmlformats.org/drawingml/2006/main" xmlns:r="http://schemas.openxmlformats.org/officeDocument/2006/relationships" xmlns:p="http://schemas.openxmlformats.org/presentationml/2006/main">
+  <p:cSld>
+    <p:spTree>
+      <p:nvGrpSpPr>
+        <p:cNvPr id="1" name=""/>
+        <p:cNvGrpSpPr/>
+        <p:nvPr/>
+      </p:nvGrpSpPr>
+      <p:grpSpPr>
+        <a:xfrm>
+          <a:off x="0" y="0"/>
+          <a:ext cx="0" cy="0"/>
+          <a:chOff x="0" y="0"/>
+          <a:chExt cx="0" cy="0"/>
+        </a:xfrm>
+      </p:grpSpPr>
+      <p:sp>
+        <p:nvSpPr>
+          <p:cNvPr id="2" name="Slide Image Placeholder 1"/>
+          <p:cNvSpPr>
+            <a:spLocks noGrp="1" noRot="1" noChangeAspect="1"/>
+          </p:cNvSpPr>
+          <p:nvPr>
+            <p:ph type="sldImg"/>
+          </p:nvPr>
+        </p:nvSpPr>
+        <p:spPr/>
+      </p:sp>
+      <p:sp>
+        <p:nvSpPr>
+          <p:cNvPr id="3" name="Notes Placeholder 2"/>
+          <p:cNvSpPr>
+            <a:spLocks noGrp="1"/>
+          </p:cNvSpPr>
+          <p:nvPr>
+            <p:ph type="body" idx="1"/>
+          </p:nvPr>
+        </p:nvSpPr>
+        <p:spPr/>
+        <p:txBody>
+          <a:bodyPr/>
+          <a:lstStyle/>
+          <a:p>
+            <a:endParaRPr lang="en-US" dirty="0"/>
+          </a:p>
+        </p:txBody>
+      </p:sp>
+      <p:sp>
+        <p:nvSpPr>
+          <p:cNvPr id="4" name="Slide Number Placeholder 3"/>
+          <p:cNvSpPr>
+            <a:spLocks noGrp="1"/>
+          </p:cNvSpPr>
+          <p:nvPr>
+            <p:ph type="sldNum" sz="quarter" idx="10"/>
+          </p:nvPr>
+        </p:nvSpPr>
+        <p:spPr/>
+        <p:txBody>
+          <a:bodyPr/>
+          <a:lstStyle/>
+          <a:p>
+            <a:fld id="{80CDABC8-FD09-47BC-822A-A981D494E0D7}" type="slidenum">
+              <a:rPr lang="en-CA" smtClean="0"/>
+              <a:t>7</a:t>
+            </a:fld>
+            <a:endParaRPr lang="en-CA"/>
+          </a:p>
+        </p:txBody>
+      </p:sp>
+    </p:spTree>
+    <p:extLst>
+      <p:ext uri="{BB962C8B-B14F-4D97-AF65-F5344CB8AC3E}">
+        <p14:creationId xmlns:p14="http://schemas.microsoft.com/office/powerpoint/2010/main" val="15755987"/>
       </p:ext>
     </p:extLst>
   </p:cSld>
@@ -3831,7 +3916,7 @@
           <a:graphicData uri="http://schemas.openxmlformats.org/presentationml/2006/ole">
             <mc:AlternateContent xmlns:mc="http://schemas.openxmlformats.org/markup-compatibility/2006">
               <mc:Choice xmlns:v="urn:schemas-microsoft-com:vml" Requires="v">
-                <p:oleObj spid="_x0000_s2185" name="think-cell Slide" r:id="rId4" imgW="270" imgH="270" progId="TCLayout.ActiveDocument.1">
+                <p:oleObj spid="_x0000_s2187" name="think-cell Slide" r:id="rId4" imgW="270" imgH="270" progId="TCLayout.ActiveDocument.1">
                   <p:embed/>
                 </p:oleObj>
               </mc:Choice>
@@ -7048,13 +7133,7 @@
       </p:grpSpPr>
       <p:sp>
         <p:nvSpPr>
-          <p:cNvPr id="2" name="Title 1">
-            <a:extLst>
-              <a:ext uri="{FF2B5EF4-FFF2-40B4-BE49-F238E27FC236}">
-                <a16:creationId xmlns:a16="http://schemas.microsoft.com/office/drawing/2014/main" id="{F50010C0-7366-3745-9EC6-6D00C60E687B}"/>
-              </a:ext>
-            </a:extLst>
-          </p:cNvPr>
+          <p:cNvPr id="2" name="Title 1"/>
           <p:cNvSpPr>
             <a:spLocks noGrp="1"/>
           </p:cNvSpPr>
@@ -7068,22 +7147,15 @@
           <a:lstStyle/>
           <a:p>
             <a:r>
-              <a:rPr lang="en-US" dirty="0" err="1"/>
-              <a:t>hello_world.ino</a:t>
-            </a:r>
-            <a:endParaRPr lang="en-US" dirty="0"/>
-          </a:p>
-        </p:txBody>
-      </p:sp>
-      <p:sp>
-        <p:nvSpPr>
-          <p:cNvPr id="3" name="Content Placeholder 2">
-            <a:extLst>
-              <a:ext uri="{FF2B5EF4-FFF2-40B4-BE49-F238E27FC236}">
-                <a16:creationId xmlns:a16="http://schemas.microsoft.com/office/drawing/2014/main" id="{F10BEE8A-9F6B-F44C-9F49-2B6B5AE77E3B}"/>
-              </a:ext>
-            </a:extLst>
-          </p:cNvPr>
+              <a:rPr lang="en-US" dirty="0"/>
+              <a:t>Test your board</a:t>
+            </a:r>
+          </a:p>
+        </p:txBody>
+      </p:sp>
+      <p:sp>
+        <p:nvSpPr>
+          <p:cNvPr id="3" name="Content Placeholder 2"/>
           <p:cNvSpPr>
             <a:spLocks noGrp="1"/>
           </p:cNvSpPr>
@@ -7097,30 +7169,86 @@
           <a:lstStyle/>
           <a:p>
             <a:r>
+              <a:rPr lang="en-US" sz="2400" dirty="0"/>
+              <a:t>Open the Arduino IDE</a:t>
+            </a:r>
+          </a:p>
+          <a:p>
+            <a:r>
+              <a:rPr lang="en-US" sz="2400" dirty="0"/>
+              <a:t>Select Tools, Click Board -&gt; Arduino Nano</a:t>
+            </a:r>
+          </a:p>
+          <a:p>
+            <a:r>
+              <a:rPr lang="en-US" sz="2400" dirty="0"/>
+              <a:t>Take note of the current devices under Tools -&gt; Port (write down so you don’t select them later)</a:t>
+            </a:r>
+          </a:p>
+          <a:p>
+            <a:r>
+              <a:rPr lang="en-US" sz="2400" dirty="0"/>
+              <a:t>Plug your Arduino in, wait about 20 seconds, and then check under Tools -&gt; Port.  </a:t>
+            </a:r>
+          </a:p>
+          <a:p>
+            <a:pPr marL="534924" lvl="3" indent="-342900"/>
+            <a:r>
+              <a:rPr lang="en-US" b="1" dirty="0"/>
+              <a:t>	</a:t>
+            </a:r>
+            <a:r>
               <a:rPr lang="en-US" dirty="0"/>
-              <a:t>Once you have </a:t>
+              <a:t>Windows – should show as a COM# device</a:t>
+            </a:r>
+          </a:p>
+          <a:p>
+            <a:pPr marL="534924" lvl="3" indent="-342900"/>
+            <a:r>
+              <a:rPr lang="en-US" dirty="0"/>
+              <a:t>	Mac Users – check the file called “</a:t>
             </a:r>
             <a:r>
               <a:rPr lang="en-US" dirty="0" err="1"/>
-              <a:t>hello_world</a:t>
+              <a:t>mac_help.txt</a:t>
             </a:r>
             <a:r>
               <a:rPr lang="en-US" dirty="0"/>
-              <a:t> running, you should be able to type a character and have your Arduino respond.  If it doesn’t, please see me before we continue!</a:t>
-            </a:r>
-          </a:p>
-          <a:p>
-            <a:endParaRPr lang="en-US" dirty="0"/>
-          </a:p>
-          <a:p>
-            <a:endParaRPr lang="en-US" dirty="0"/>
+              <a:t>” in the repo.</a:t>
+            </a:r>
+          </a:p>
+          <a:p>
+            <a:r>
+              <a:rPr lang="en-US" sz="2400" dirty="0"/>
+              <a:t>Open the file </a:t>
+            </a:r>
+            <a:r>
+              <a:rPr lang="en-US" sz="2400" dirty="0" err="1"/>
+              <a:t>helloworld</a:t>
+            </a:r>
+            <a:r>
+              <a:rPr lang="en-US" sz="2400" dirty="0"/>
+              <a:t>/</a:t>
+            </a:r>
+            <a:r>
+              <a:rPr lang="en-US" sz="2400" dirty="0" err="1"/>
+              <a:t>helloworld.ino</a:t>
+            </a:r>
+            <a:r>
+              <a:rPr lang="en-US" sz="2400" dirty="0"/>
+              <a:t> and click the run button in Arduino</a:t>
+            </a:r>
+          </a:p>
+          <a:p>
+            <a:pPr lvl="1"/>
+            <a:endParaRPr lang="en-US" sz="2400" dirty="0"/>
           </a:p>
         </p:txBody>
       </p:sp>
     </p:spTree>
     <p:extLst>
       <p:ext uri="{BB962C8B-B14F-4D97-AF65-F5344CB8AC3E}">
-        <p14:creationId xmlns:p14="http://schemas.microsoft.com/office/powerpoint/2010/main" val="3020462935"/>
+        <p14:creationId xmlns:p14="http://schemas.microsoft.com/office/powerpoint/2010/main" val="2066430322"/>
       </p:ext>
     </p:extLst>
   </p:cSld>
@@ -7152,7 +7280,108 @@
           <p:cNvPr id="2" name="Title 1">
             <a:extLst>
               <a:ext uri="{FF2B5EF4-FFF2-40B4-BE49-F238E27FC236}">
-                <a16:creationId xmlns:a16="http://schemas.microsoft.com/office/drawing/2014/main" id="{9F5FF66F-1CD4-874A-B044-6C36DC019151}"/>
+                <a16:creationId xmlns:a16="http://schemas.microsoft.com/office/drawing/2014/main" xmlns="" id="{F50010C0-7366-3745-9EC6-6D00C60E687B}"/>
+              </a:ext>
+            </a:extLst>
+          </p:cNvPr>
+          <p:cNvSpPr>
+            <a:spLocks noGrp="1"/>
+          </p:cNvSpPr>
+          <p:nvPr>
+            <p:ph type="title"/>
+          </p:nvPr>
+        </p:nvSpPr>
+        <p:spPr/>
+        <p:txBody>
+          <a:bodyPr/>
+          <a:lstStyle/>
+          <a:p>
+            <a:r>
+              <a:rPr lang="en-US" dirty="0" err="1"/>
+              <a:t>hello_world.ino</a:t>
+            </a:r>
+            <a:endParaRPr lang="en-US" dirty="0"/>
+          </a:p>
+        </p:txBody>
+      </p:sp>
+      <p:sp>
+        <p:nvSpPr>
+          <p:cNvPr id="3" name="Content Placeholder 2">
+            <a:extLst>
+              <a:ext uri="{FF2B5EF4-FFF2-40B4-BE49-F238E27FC236}">
+                <a16:creationId xmlns:a16="http://schemas.microsoft.com/office/drawing/2014/main" xmlns="" id="{F10BEE8A-9F6B-F44C-9F49-2B6B5AE77E3B}"/>
+              </a:ext>
+            </a:extLst>
+          </p:cNvPr>
+          <p:cNvSpPr>
+            <a:spLocks noGrp="1"/>
+          </p:cNvSpPr>
+          <p:nvPr>
+            <p:ph idx="1"/>
+          </p:nvPr>
+        </p:nvSpPr>
+        <p:spPr/>
+        <p:txBody>
+          <a:bodyPr/>
+          <a:lstStyle/>
+          <a:p>
+            <a:r>
+              <a:rPr lang="en-US" dirty="0"/>
+              <a:t>Once you have </a:t>
+            </a:r>
+            <a:r>
+              <a:rPr lang="en-US" dirty="0" err="1"/>
+              <a:t>hello_world</a:t>
+            </a:r>
+            <a:r>
+              <a:rPr lang="en-US" dirty="0"/>
+              <a:t> running, you should be able to type a character and have your Arduino respond.  If it doesn’t, please see me before we continue!</a:t>
+            </a:r>
+          </a:p>
+          <a:p>
+            <a:endParaRPr lang="en-US" dirty="0"/>
+          </a:p>
+          <a:p>
+            <a:endParaRPr lang="en-US" dirty="0"/>
+          </a:p>
+        </p:txBody>
+      </p:sp>
+    </p:spTree>
+    <p:extLst>
+      <p:ext uri="{BB962C8B-B14F-4D97-AF65-F5344CB8AC3E}">
+        <p14:creationId xmlns:p14="http://schemas.microsoft.com/office/powerpoint/2010/main" val="3020462935"/>
+      </p:ext>
+    </p:extLst>
+  </p:cSld>
+  <p:clrMapOvr>
+    <a:masterClrMapping/>
+  </p:clrMapOvr>
+</p:sld>
+</file>
+
+<file path=ppt/slides/slide12.xml><?xml version="1.0" encoding="utf-8"?>
+<p:sld xmlns:a="http://schemas.openxmlformats.org/drawingml/2006/main" xmlns:r="http://schemas.openxmlformats.org/officeDocument/2006/relationships" xmlns:p="http://schemas.openxmlformats.org/presentationml/2006/main">
+  <p:cSld>
+    <p:spTree>
+      <p:nvGrpSpPr>
+        <p:cNvPr id="1" name=""/>
+        <p:cNvGrpSpPr/>
+        <p:nvPr/>
+      </p:nvGrpSpPr>
+      <p:grpSpPr>
+        <a:xfrm>
+          <a:off x="0" y="0"/>
+          <a:ext cx="0" cy="0"/>
+          <a:chOff x="0" y="0"/>
+          <a:chExt cx="0" cy="0"/>
+        </a:xfrm>
+      </p:grpSpPr>
+      <p:sp>
+        <p:nvSpPr>
+          <p:cNvPr id="2" name="Title 1">
+            <a:extLst>
+              <a:ext uri="{FF2B5EF4-FFF2-40B4-BE49-F238E27FC236}">
+                <a16:creationId xmlns:a16="http://schemas.microsoft.com/office/drawing/2014/main" xmlns="" id="{9F5FF66F-1CD4-874A-B044-6C36DC019151}"/>
               </a:ext>
             </a:extLst>
           </p:cNvPr>
@@ -7180,7 +7409,7 @@
           <p:cNvPr id="5" name="Content Placeholder 4">
             <a:extLst>
               <a:ext uri="{FF2B5EF4-FFF2-40B4-BE49-F238E27FC236}">
-                <a16:creationId xmlns:a16="http://schemas.microsoft.com/office/drawing/2014/main" id="{482B9516-4E84-7C4F-A41E-5F1803F807A1}"/>
+                <a16:creationId xmlns:a16="http://schemas.microsoft.com/office/drawing/2014/main" xmlns="" id="{482B9516-4E84-7C4F-A41E-5F1803F807A1}"/>
               </a:ext>
             </a:extLst>
           </p:cNvPr>
@@ -7223,7 +7452,7 @@
 </p:sld>
 </file>
 
-<file path=ppt/slides/slide12.xml><?xml version="1.0" encoding="utf-8"?>
+<file path=ppt/slides/slide13.xml><?xml version="1.0" encoding="utf-8"?>
 <p:sld xmlns:a="http://schemas.openxmlformats.org/drawingml/2006/main" xmlns:r="http://schemas.openxmlformats.org/officeDocument/2006/relationships" xmlns:p="http://schemas.openxmlformats.org/presentationml/2006/main">
   <p:cSld>
     <p:spTree>
@@ -7245,7 +7474,7 @@
           <p:cNvPr id="2" name="Title 1">
             <a:extLst>
               <a:ext uri="{FF2B5EF4-FFF2-40B4-BE49-F238E27FC236}">
-                <a16:creationId xmlns:a16="http://schemas.microsoft.com/office/drawing/2014/main" id="{4F35632C-88ED-1648-8204-F374C216AEAB}"/>
+                <a16:creationId xmlns:a16="http://schemas.microsoft.com/office/drawing/2014/main" xmlns="" id="{4F35632C-88ED-1648-8204-F374C216AEAB}"/>
               </a:ext>
             </a:extLst>
           </p:cNvPr>
@@ -7273,7 +7502,7 @@
           <p:cNvPr id="5" name="Content Placeholder 4">
             <a:extLst>
               <a:ext uri="{FF2B5EF4-FFF2-40B4-BE49-F238E27FC236}">
-                <a16:creationId xmlns:a16="http://schemas.microsoft.com/office/drawing/2014/main" id="{1359FDAD-4B75-5F40-9A2E-418F3309F92A}"/>
+                <a16:creationId xmlns:a16="http://schemas.microsoft.com/office/drawing/2014/main" xmlns="" id="{1359FDAD-4B75-5F40-9A2E-418F3309F92A}"/>
               </a:ext>
             </a:extLst>
           </p:cNvPr>
@@ -7316,125 +7545,6 @@
 </p:sld>
 </file>
 
-<file path=ppt/slides/slide13.xml><?xml version="1.0" encoding="utf-8"?>
-<p:sld xmlns:a="http://schemas.openxmlformats.org/drawingml/2006/main" xmlns:r="http://schemas.openxmlformats.org/officeDocument/2006/relationships" xmlns:p="http://schemas.openxmlformats.org/presentationml/2006/main">
-  <p:cSld>
-    <p:spTree>
-      <p:nvGrpSpPr>
-        <p:cNvPr id="1" name=""/>
-        <p:cNvGrpSpPr/>
-        <p:nvPr/>
-      </p:nvGrpSpPr>
-      <p:grpSpPr>
-        <a:xfrm>
-          <a:off x="0" y="0"/>
-          <a:ext cx="0" cy="0"/>
-          <a:chOff x="0" y="0"/>
-          <a:chExt cx="0" cy="0"/>
-        </a:xfrm>
-      </p:grpSpPr>
-      <p:sp>
-        <p:nvSpPr>
-          <p:cNvPr id="2" name="Title 1">
-            <a:extLst>
-              <a:ext uri="{FF2B5EF4-FFF2-40B4-BE49-F238E27FC236}">
-                <a16:creationId xmlns:a16="http://schemas.microsoft.com/office/drawing/2014/main" id="{6EE45210-DBBD-C044-B9C4-FFC465BD6D41}"/>
-              </a:ext>
-            </a:extLst>
-          </p:cNvPr>
-          <p:cNvSpPr>
-            <a:spLocks noGrp="1"/>
-          </p:cNvSpPr>
-          <p:nvPr>
-            <p:ph type="title"/>
-          </p:nvPr>
-        </p:nvSpPr>
-        <p:spPr/>
-        <p:txBody>
-          <a:bodyPr/>
-          <a:lstStyle/>
-          <a:p>
-            <a:r>
-              <a:rPr lang="en-US" dirty="0"/>
-              <a:t>Parts we’re using</a:t>
-            </a:r>
-          </a:p>
-        </p:txBody>
-      </p:sp>
-      <p:sp>
-        <p:nvSpPr>
-          <p:cNvPr id="3" name="Content Placeholder 2">
-            <a:extLst>
-              <a:ext uri="{FF2B5EF4-FFF2-40B4-BE49-F238E27FC236}">
-                <a16:creationId xmlns:a16="http://schemas.microsoft.com/office/drawing/2014/main" id="{91E7CCBF-79D3-FF4D-A055-7091BAE93FFF}"/>
-              </a:ext>
-            </a:extLst>
-          </p:cNvPr>
-          <p:cNvSpPr>
-            <a:spLocks noGrp="1"/>
-          </p:cNvSpPr>
-          <p:nvPr>
-            <p:ph idx="1"/>
-          </p:nvPr>
-        </p:nvSpPr>
-        <p:spPr/>
-        <p:txBody>
-          <a:bodyPr/>
-          <a:lstStyle/>
-          <a:p>
-            <a:r>
-              <a:rPr lang="en-US" dirty="0"/>
-              <a:t>NRF24L01+ Wireless Transceiver</a:t>
-            </a:r>
-          </a:p>
-          <a:p>
-            <a:r>
-              <a:rPr lang="en-US" dirty="0"/>
-              <a:t>Arduino Nano</a:t>
-            </a:r>
-          </a:p>
-          <a:p>
-            <a:r>
-              <a:rPr lang="en-US" dirty="0"/>
-              <a:t>10 µf Capacitor</a:t>
-            </a:r>
-          </a:p>
-          <a:p>
-            <a:r>
-              <a:rPr lang="en-US" dirty="0"/>
-              <a:t>Breadboard</a:t>
-            </a:r>
-          </a:p>
-          <a:p>
-            <a:r>
-              <a:rPr lang="en-US" dirty="0"/>
-              <a:t>Shoe Boxes</a:t>
-            </a:r>
-          </a:p>
-          <a:p>
-            <a:pPr marL="0" indent="0">
-              <a:buNone/>
-            </a:pPr>
-            <a:endParaRPr lang="en-US" dirty="0"/>
-          </a:p>
-          <a:p>
-            <a:endParaRPr lang="en-US" dirty="0"/>
-          </a:p>
-        </p:txBody>
-      </p:sp>
-    </p:spTree>
-    <p:extLst>
-      <p:ext uri="{BB962C8B-B14F-4D97-AF65-F5344CB8AC3E}">
-        <p14:creationId xmlns:p14="http://schemas.microsoft.com/office/powerpoint/2010/main" val="138244492"/>
-      </p:ext>
-    </p:extLst>
-  </p:cSld>
-  <p:clrMapOvr>
-    <a:masterClrMapping/>
-  </p:clrMapOvr>
-</p:sld>
-</file>
-
 <file path=ppt/slides/slide14.xml><?xml version="1.0" encoding="utf-8"?>
 <p:sld xmlns:a="http://schemas.openxmlformats.org/drawingml/2006/main" xmlns:r="http://schemas.openxmlformats.org/officeDocument/2006/relationships" xmlns:p="http://schemas.openxmlformats.org/presentationml/2006/main">
   <p:cSld>
@@ -7457,7 +7567,7 @@
           <p:cNvPr id="2" name="Title 1">
             <a:extLst>
               <a:ext uri="{FF2B5EF4-FFF2-40B4-BE49-F238E27FC236}">
-                <a16:creationId xmlns:a16="http://schemas.microsoft.com/office/drawing/2014/main" id="{C041CE7C-781B-B34F-A0DE-06215634E945}"/>
+                <a16:creationId xmlns:a16="http://schemas.microsoft.com/office/drawing/2014/main" xmlns="" id="{6EE45210-DBBD-C044-B9C4-FFC465BD6D41}"/>
               </a:ext>
             </a:extLst>
           </p:cNvPr>
@@ -7475,7 +7585,7 @@
           <a:p>
             <a:r>
               <a:rPr lang="en-US" dirty="0"/>
-              <a:t>The build</a:t>
+              <a:t>Parts we’re using</a:t>
             </a:r>
           </a:p>
         </p:txBody>
@@ -7485,7 +7595,126 @@
           <p:cNvPr id="3" name="Content Placeholder 2">
             <a:extLst>
               <a:ext uri="{FF2B5EF4-FFF2-40B4-BE49-F238E27FC236}">
-                <a16:creationId xmlns:a16="http://schemas.microsoft.com/office/drawing/2014/main" id="{AF754E19-1B4C-2649-B0EC-CBAE049295C4}"/>
+                <a16:creationId xmlns:a16="http://schemas.microsoft.com/office/drawing/2014/main" xmlns="" id="{91E7CCBF-79D3-FF4D-A055-7091BAE93FFF}"/>
+              </a:ext>
+            </a:extLst>
+          </p:cNvPr>
+          <p:cNvSpPr>
+            <a:spLocks noGrp="1"/>
+          </p:cNvSpPr>
+          <p:nvPr>
+            <p:ph idx="1"/>
+          </p:nvPr>
+        </p:nvSpPr>
+        <p:spPr/>
+        <p:txBody>
+          <a:bodyPr/>
+          <a:lstStyle/>
+          <a:p>
+            <a:r>
+              <a:rPr lang="en-US" dirty="0"/>
+              <a:t>NRF24L01+ Wireless Transceiver</a:t>
+            </a:r>
+          </a:p>
+          <a:p>
+            <a:r>
+              <a:rPr lang="en-US" dirty="0"/>
+              <a:t>Arduino Nano</a:t>
+            </a:r>
+          </a:p>
+          <a:p>
+            <a:r>
+              <a:rPr lang="en-US" dirty="0"/>
+              <a:t>10 µf Capacitor</a:t>
+            </a:r>
+          </a:p>
+          <a:p>
+            <a:r>
+              <a:rPr lang="en-US" dirty="0"/>
+              <a:t>Breadboard</a:t>
+            </a:r>
+          </a:p>
+          <a:p>
+            <a:r>
+              <a:rPr lang="en-US" dirty="0"/>
+              <a:t>Shoe Boxes</a:t>
+            </a:r>
+          </a:p>
+          <a:p>
+            <a:pPr marL="0" indent="0">
+              <a:buNone/>
+            </a:pPr>
+            <a:endParaRPr lang="en-US" dirty="0"/>
+          </a:p>
+          <a:p>
+            <a:endParaRPr lang="en-US" dirty="0"/>
+          </a:p>
+        </p:txBody>
+      </p:sp>
+    </p:spTree>
+    <p:extLst>
+      <p:ext uri="{BB962C8B-B14F-4D97-AF65-F5344CB8AC3E}">
+        <p14:creationId xmlns:p14="http://schemas.microsoft.com/office/powerpoint/2010/main" val="138244492"/>
+      </p:ext>
+    </p:extLst>
+  </p:cSld>
+  <p:clrMapOvr>
+    <a:masterClrMapping/>
+  </p:clrMapOvr>
+</p:sld>
+</file>
+
+<file path=ppt/slides/slide15.xml><?xml version="1.0" encoding="utf-8"?>
+<p:sld xmlns:a="http://schemas.openxmlformats.org/drawingml/2006/main" xmlns:r="http://schemas.openxmlformats.org/officeDocument/2006/relationships" xmlns:p="http://schemas.openxmlformats.org/presentationml/2006/main">
+  <p:cSld>
+    <p:spTree>
+      <p:nvGrpSpPr>
+        <p:cNvPr id="1" name=""/>
+        <p:cNvGrpSpPr/>
+        <p:nvPr/>
+      </p:nvGrpSpPr>
+      <p:grpSpPr>
+        <a:xfrm>
+          <a:off x="0" y="0"/>
+          <a:ext cx="0" cy="0"/>
+          <a:chOff x="0" y="0"/>
+          <a:chExt cx="0" cy="0"/>
+        </a:xfrm>
+      </p:grpSpPr>
+      <p:sp>
+        <p:nvSpPr>
+          <p:cNvPr id="2" name="Title 1">
+            <a:extLst>
+              <a:ext uri="{FF2B5EF4-FFF2-40B4-BE49-F238E27FC236}">
+                <a16:creationId xmlns:a16="http://schemas.microsoft.com/office/drawing/2014/main" xmlns="" id="{C041CE7C-781B-B34F-A0DE-06215634E945}"/>
+              </a:ext>
+            </a:extLst>
+          </p:cNvPr>
+          <p:cNvSpPr>
+            <a:spLocks noGrp="1"/>
+          </p:cNvSpPr>
+          <p:nvPr>
+            <p:ph type="title"/>
+          </p:nvPr>
+        </p:nvSpPr>
+        <p:spPr/>
+        <p:txBody>
+          <a:bodyPr/>
+          <a:lstStyle/>
+          <a:p>
+            <a:r>
+              <a:rPr lang="en-US" dirty="0"/>
+              <a:t>The build</a:t>
+            </a:r>
+          </a:p>
+        </p:txBody>
+      </p:sp>
+      <p:sp>
+        <p:nvSpPr>
+          <p:cNvPr id="3" name="Content Placeholder 2">
+            <a:extLst>
+              <a:ext uri="{FF2B5EF4-FFF2-40B4-BE49-F238E27FC236}">
+                <a16:creationId xmlns:a16="http://schemas.microsoft.com/office/drawing/2014/main" xmlns="" id="{AF754E19-1B4C-2649-B0EC-CBAE049295C4}"/>
               </a:ext>
             </a:extLst>
           </p:cNvPr>
@@ -7516,7 +7745,7 @@
           <p:cNvPr id="4" name="Picture 3">
             <a:extLst>
               <a:ext uri="{FF2B5EF4-FFF2-40B4-BE49-F238E27FC236}">
-                <a16:creationId xmlns:a16="http://schemas.microsoft.com/office/drawing/2014/main" id="{A623D7EC-690E-9946-81F1-A83F55373139}"/>
+                <a16:creationId xmlns:a16="http://schemas.microsoft.com/office/drawing/2014/main" xmlns="" id="{A623D7EC-690E-9946-81F1-A83F55373139}"/>
               </a:ext>
             </a:extLst>
           </p:cNvPr>
@@ -7546,7 +7775,7 @@
           <p:cNvPr id="7" name="Table 6">
             <a:extLst>
               <a:ext uri="{FF2B5EF4-FFF2-40B4-BE49-F238E27FC236}">
-                <a16:creationId xmlns:a16="http://schemas.microsoft.com/office/drawing/2014/main" id="{37830F17-64F7-4845-9946-61084F9B25A5}"/>
+                <a16:creationId xmlns:a16="http://schemas.microsoft.com/office/drawing/2014/main" xmlns="" id="{37830F17-64F7-4845-9946-61084F9B25A5}"/>
               </a:ext>
             </a:extLst>
           </p:cNvPr>
@@ -7575,14 +7804,14 @@
                 <a:gridCol w="2047766">
                   <a:extLst>
                     <a:ext uri="{9D8B030D-6E8A-4147-A177-3AD203B41FA5}">
-                      <a16:colId xmlns:a16="http://schemas.microsoft.com/office/drawing/2014/main" val="2540224487"/>
+                      <a16:colId xmlns:a16="http://schemas.microsoft.com/office/drawing/2014/main" xmlns="" val="2540224487"/>
                     </a:ext>
                   </a:extLst>
                 </a:gridCol>
                 <a:gridCol w="2047766">
                   <a:extLst>
                     <a:ext uri="{9D8B030D-6E8A-4147-A177-3AD203B41FA5}">
-                      <a16:colId xmlns:a16="http://schemas.microsoft.com/office/drawing/2014/main" val="3651891508"/>
+                      <a16:colId xmlns:a16="http://schemas.microsoft.com/office/drawing/2014/main" xmlns="" val="3651891508"/>
                     </a:ext>
                   </a:extLst>
                 </a:gridCol>
@@ -7616,7 +7845,7 @@
                 </a:tc>
                 <a:extLst>
                   <a:ext uri="{0D108BD9-81ED-4DB2-BD59-A6C34878D82A}">
-                    <a16:rowId xmlns:a16="http://schemas.microsoft.com/office/drawing/2014/main" val="3307099543"/>
+                    <a16:rowId xmlns:a16="http://schemas.microsoft.com/office/drawing/2014/main" xmlns="" val="3307099543"/>
                   </a:ext>
                 </a:extLst>
               </a:tr>
@@ -7649,7 +7878,7 @@
                 </a:tc>
                 <a:extLst>
                   <a:ext uri="{0D108BD9-81ED-4DB2-BD59-A6C34878D82A}">
-                    <a16:rowId xmlns:a16="http://schemas.microsoft.com/office/drawing/2014/main" val="777203068"/>
+                    <a16:rowId xmlns:a16="http://schemas.microsoft.com/office/drawing/2014/main" xmlns="" val="777203068"/>
                   </a:ext>
                 </a:extLst>
               </a:tr>
@@ -7682,7 +7911,7 @@
                 </a:tc>
                 <a:extLst>
                   <a:ext uri="{0D108BD9-81ED-4DB2-BD59-A6C34878D82A}">
-                    <a16:rowId xmlns:a16="http://schemas.microsoft.com/office/drawing/2014/main" val="286758553"/>
+                    <a16:rowId xmlns:a16="http://schemas.microsoft.com/office/drawing/2014/main" xmlns="" val="286758553"/>
                   </a:ext>
                 </a:extLst>
               </a:tr>
@@ -7715,7 +7944,7 @@
                 </a:tc>
                 <a:extLst>
                   <a:ext uri="{0D108BD9-81ED-4DB2-BD59-A6C34878D82A}">
-                    <a16:rowId xmlns:a16="http://schemas.microsoft.com/office/drawing/2014/main" val="3595430476"/>
+                    <a16:rowId xmlns:a16="http://schemas.microsoft.com/office/drawing/2014/main" xmlns="" val="3595430476"/>
                   </a:ext>
                 </a:extLst>
               </a:tr>
@@ -7748,7 +7977,7 @@
                 </a:tc>
                 <a:extLst>
                   <a:ext uri="{0D108BD9-81ED-4DB2-BD59-A6C34878D82A}">
-                    <a16:rowId xmlns:a16="http://schemas.microsoft.com/office/drawing/2014/main" val="2066082483"/>
+                    <a16:rowId xmlns:a16="http://schemas.microsoft.com/office/drawing/2014/main" xmlns="" val="2066082483"/>
                   </a:ext>
                 </a:extLst>
               </a:tr>
@@ -7781,7 +8010,7 @@
                 </a:tc>
                 <a:extLst>
                   <a:ext uri="{0D108BD9-81ED-4DB2-BD59-A6C34878D82A}">
-                    <a16:rowId xmlns:a16="http://schemas.microsoft.com/office/drawing/2014/main" val="1726522343"/>
+                    <a16:rowId xmlns:a16="http://schemas.microsoft.com/office/drawing/2014/main" xmlns="" val="1726522343"/>
                   </a:ext>
                 </a:extLst>
               </a:tr>
@@ -7814,7 +8043,7 @@
                 </a:tc>
                 <a:extLst>
                   <a:ext uri="{0D108BD9-81ED-4DB2-BD59-A6C34878D82A}">
-                    <a16:rowId xmlns:a16="http://schemas.microsoft.com/office/drawing/2014/main" val="3824281077"/>
+                    <a16:rowId xmlns:a16="http://schemas.microsoft.com/office/drawing/2014/main" xmlns="" val="3824281077"/>
                   </a:ext>
                 </a:extLst>
               </a:tr>
@@ -7847,7 +8076,7 @@
                 </a:tc>
                 <a:extLst>
                   <a:ext uri="{0D108BD9-81ED-4DB2-BD59-A6C34878D82A}">
-                    <a16:rowId xmlns:a16="http://schemas.microsoft.com/office/drawing/2014/main" val="1033745723"/>
+                    <a16:rowId xmlns:a16="http://schemas.microsoft.com/office/drawing/2014/main" xmlns="" val="1033745723"/>
                   </a:ext>
                 </a:extLst>
               </a:tr>
@@ -7880,7 +8109,7 @@
                 </a:tc>
                 <a:extLst>
                   <a:ext uri="{0D108BD9-81ED-4DB2-BD59-A6C34878D82A}">
-                    <a16:rowId xmlns:a16="http://schemas.microsoft.com/office/drawing/2014/main" val="3694844833"/>
+                    <a16:rowId xmlns:a16="http://schemas.microsoft.com/office/drawing/2014/main" xmlns="" val="3694844833"/>
                   </a:ext>
                 </a:extLst>
               </a:tr>
@@ -7892,107 +8121,6 @@
     <p:extLst>
       <p:ext uri="{BB962C8B-B14F-4D97-AF65-F5344CB8AC3E}">
         <p14:creationId xmlns:p14="http://schemas.microsoft.com/office/powerpoint/2010/main" val="2808610350"/>
-      </p:ext>
-    </p:extLst>
-  </p:cSld>
-  <p:clrMapOvr>
-    <a:masterClrMapping/>
-  </p:clrMapOvr>
-</p:sld>
-</file>
-
-<file path=ppt/slides/slide15.xml><?xml version="1.0" encoding="utf-8"?>
-<p:sld xmlns:a="http://schemas.openxmlformats.org/drawingml/2006/main" xmlns:r="http://schemas.openxmlformats.org/officeDocument/2006/relationships" xmlns:p="http://schemas.openxmlformats.org/presentationml/2006/main">
-  <p:cSld>
-    <p:spTree>
-      <p:nvGrpSpPr>
-        <p:cNvPr id="1" name=""/>
-        <p:cNvGrpSpPr/>
-        <p:nvPr/>
-      </p:nvGrpSpPr>
-      <p:grpSpPr>
-        <a:xfrm>
-          <a:off x="0" y="0"/>
-          <a:ext cx="0" cy="0"/>
-          <a:chOff x="0" y="0"/>
-          <a:chExt cx="0" cy="0"/>
-        </a:xfrm>
-      </p:grpSpPr>
-      <p:sp>
-        <p:nvSpPr>
-          <p:cNvPr id="2" name="Title 1">
-            <a:extLst>
-              <a:ext uri="{FF2B5EF4-FFF2-40B4-BE49-F238E27FC236}">
-                <a16:creationId xmlns:a16="http://schemas.microsoft.com/office/drawing/2014/main" id="{AD520C1D-50F7-4E43-A655-21A88C374FF7}"/>
-              </a:ext>
-            </a:extLst>
-          </p:cNvPr>
-          <p:cNvSpPr>
-            <a:spLocks noGrp="1"/>
-          </p:cNvSpPr>
-          <p:nvPr>
-            <p:ph type="title"/>
-          </p:nvPr>
-        </p:nvSpPr>
-        <p:spPr/>
-        <p:txBody>
-          <a:bodyPr/>
-          <a:lstStyle/>
-          <a:p>
-            <a:r>
-              <a:rPr lang="en-US" dirty="0"/>
-              <a:t>Capacitor</a:t>
-            </a:r>
-          </a:p>
-        </p:txBody>
-      </p:sp>
-      <p:sp>
-        <p:nvSpPr>
-          <p:cNvPr id="3" name="Content Placeholder 2">
-            <a:extLst>
-              <a:ext uri="{FF2B5EF4-FFF2-40B4-BE49-F238E27FC236}">
-                <a16:creationId xmlns:a16="http://schemas.microsoft.com/office/drawing/2014/main" id="{6220C2FB-BDD3-1D44-8921-B85F2F43A378}"/>
-              </a:ext>
-            </a:extLst>
-          </p:cNvPr>
-          <p:cNvSpPr>
-            <a:spLocks noGrp="1"/>
-          </p:cNvSpPr>
-          <p:nvPr>
-            <p:ph idx="1"/>
-          </p:nvPr>
-        </p:nvSpPr>
-        <p:spPr/>
-        <p:txBody>
-          <a:bodyPr/>
-          <a:lstStyle/>
-          <a:p>
-            <a:r>
-              <a:rPr lang="en-US" dirty="0"/>
-              <a:t>Bursting a signal requires a lot of energy – around 100 mA depending on the transmission strength.  The Arduino Mano is not capable of handling this burst over 3.3v, so you have to add a capacitor to account for the voltage drops. </a:t>
-            </a:r>
-          </a:p>
-          <a:p>
-            <a:r>
-              <a:rPr lang="en-US" dirty="0"/>
-              <a:t>The capacitor must be connected across 3.3v and Ground on your NRF24L01.  See photo in diagrams called “capacitor” for info on how to do this.</a:t>
-            </a:r>
-          </a:p>
-          <a:p>
-            <a:r>
-              <a:rPr lang="en-US" b="1" dirty="0"/>
-              <a:t>Be sure that the - - - (on the side of the capacitor) is on the ground side – you’ll short out the device if not!</a:t>
-            </a:r>
-          </a:p>
-          <a:p>
-            <a:endParaRPr lang="en-US" dirty="0"/>
-          </a:p>
-        </p:txBody>
-      </p:sp>
-    </p:spTree>
-    <p:extLst>
-      <p:ext uri="{BB962C8B-B14F-4D97-AF65-F5344CB8AC3E}">
-        <p14:creationId xmlns:p14="http://schemas.microsoft.com/office/powerpoint/2010/main" val="2850825567"/>
       </p:ext>
     </p:extLst>
   </p:cSld>
@@ -8024,7 +8152,7 @@
           <p:cNvPr id="2" name="Title 1">
             <a:extLst>
               <a:ext uri="{FF2B5EF4-FFF2-40B4-BE49-F238E27FC236}">
-                <a16:creationId xmlns:a16="http://schemas.microsoft.com/office/drawing/2014/main" id="{F38AA60E-F1A4-B341-8418-AA355E912D67}"/>
+                <a16:creationId xmlns:a16="http://schemas.microsoft.com/office/drawing/2014/main" xmlns="" id="{AD520C1D-50F7-4E43-A655-21A88C374FF7}"/>
               </a:ext>
             </a:extLst>
           </p:cNvPr>
@@ -8042,7 +8170,7 @@
           <a:p>
             <a:r>
               <a:rPr lang="en-US" dirty="0"/>
-              <a:t>Tactical Switches</a:t>
+              <a:t>Capacitor</a:t>
             </a:r>
           </a:p>
         </p:txBody>
@@ -8052,7 +8180,108 @@
           <p:cNvPr id="3" name="Content Placeholder 2">
             <a:extLst>
               <a:ext uri="{FF2B5EF4-FFF2-40B4-BE49-F238E27FC236}">
-                <a16:creationId xmlns:a16="http://schemas.microsoft.com/office/drawing/2014/main" id="{15AF0856-CD6C-F546-AFC9-359BAA15E7AE}"/>
+                <a16:creationId xmlns:a16="http://schemas.microsoft.com/office/drawing/2014/main" xmlns="" id="{6220C2FB-BDD3-1D44-8921-B85F2F43A378}"/>
+              </a:ext>
+            </a:extLst>
+          </p:cNvPr>
+          <p:cNvSpPr>
+            <a:spLocks noGrp="1"/>
+          </p:cNvSpPr>
+          <p:nvPr>
+            <p:ph idx="1"/>
+          </p:nvPr>
+        </p:nvSpPr>
+        <p:spPr/>
+        <p:txBody>
+          <a:bodyPr/>
+          <a:lstStyle/>
+          <a:p>
+            <a:r>
+              <a:rPr lang="en-US" dirty="0"/>
+              <a:t>Bursting a signal requires a lot of energy – around 100 mA depending on the transmission strength.  The Arduino Mano is not capable of handling this burst over 3.3v, so you have to add a capacitor to account for the voltage drops. </a:t>
+            </a:r>
+          </a:p>
+          <a:p>
+            <a:r>
+              <a:rPr lang="en-US" dirty="0"/>
+              <a:t>The capacitor must be connected across 3.3v and Ground on your NRF24L01.  See photo in diagrams called “capacitor” for info on how to do this.</a:t>
+            </a:r>
+          </a:p>
+          <a:p>
+            <a:r>
+              <a:rPr lang="en-US" b="1" dirty="0"/>
+              <a:t>Be sure that the - - - (on the side of the capacitor) is on the ground side – you’ll short out the device if not!</a:t>
+            </a:r>
+          </a:p>
+          <a:p>
+            <a:endParaRPr lang="en-US" dirty="0"/>
+          </a:p>
+        </p:txBody>
+      </p:sp>
+    </p:spTree>
+    <p:extLst>
+      <p:ext uri="{BB962C8B-B14F-4D97-AF65-F5344CB8AC3E}">
+        <p14:creationId xmlns:p14="http://schemas.microsoft.com/office/powerpoint/2010/main" val="2850825567"/>
+      </p:ext>
+    </p:extLst>
+  </p:cSld>
+  <p:clrMapOvr>
+    <a:masterClrMapping/>
+  </p:clrMapOvr>
+</p:sld>
+</file>
+
+<file path=ppt/slides/slide17.xml><?xml version="1.0" encoding="utf-8"?>
+<p:sld xmlns:a="http://schemas.openxmlformats.org/drawingml/2006/main" xmlns:r="http://schemas.openxmlformats.org/officeDocument/2006/relationships" xmlns:p="http://schemas.openxmlformats.org/presentationml/2006/main">
+  <p:cSld>
+    <p:spTree>
+      <p:nvGrpSpPr>
+        <p:cNvPr id="1" name=""/>
+        <p:cNvGrpSpPr/>
+        <p:nvPr/>
+      </p:nvGrpSpPr>
+      <p:grpSpPr>
+        <a:xfrm>
+          <a:off x="0" y="0"/>
+          <a:ext cx="0" cy="0"/>
+          <a:chOff x="0" y="0"/>
+          <a:chExt cx="0" cy="0"/>
+        </a:xfrm>
+      </p:grpSpPr>
+      <p:sp>
+        <p:nvSpPr>
+          <p:cNvPr id="2" name="Title 1">
+            <a:extLst>
+              <a:ext uri="{FF2B5EF4-FFF2-40B4-BE49-F238E27FC236}">
+                <a16:creationId xmlns:a16="http://schemas.microsoft.com/office/drawing/2014/main" xmlns="" id="{F38AA60E-F1A4-B341-8418-AA355E912D67}"/>
+              </a:ext>
+            </a:extLst>
+          </p:cNvPr>
+          <p:cNvSpPr>
+            <a:spLocks noGrp="1"/>
+          </p:cNvSpPr>
+          <p:nvPr>
+            <p:ph type="title"/>
+          </p:nvPr>
+        </p:nvSpPr>
+        <p:spPr/>
+        <p:txBody>
+          <a:bodyPr/>
+          <a:lstStyle/>
+          <a:p>
+            <a:r>
+              <a:rPr lang="en-US" dirty="0"/>
+              <a:t>Tactical Switches</a:t>
+            </a:r>
+          </a:p>
+        </p:txBody>
+      </p:sp>
+      <p:sp>
+        <p:nvSpPr>
+          <p:cNvPr id="3" name="Content Placeholder 2">
+            <a:extLst>
+              <a:ext uri="{FF2B5EF4-FFF2-40B4-BE49-F238E27FC236}">
+                <a16:creationId xmlns:a16="http://schemas.microsoft.com/office/drawing/2014/main" xmlns="" id="{15AF0856-CD6C-F546-AFC9-359BAA15E7AE}"/>
               </a:ext>
             </a:extLst>
           </p:cNvPr>
@@ -8077,7 +8306,7 @@
           <p:cNvPr id="4" name="Picture 3">
             <a:extLst>
               <a:ext uri="{FF2B5EF4-FFF2-40B4-BE49-F238E27FC236}">
-                <a16:creationId xmlns:a16="http://schemas.microsoft.com/office/drawing/2014/main" id="{8BB03EA0-A71F-AC4A-AB6F-D0574ED68F13}"/>
+                <a16:creationId xmlns:a16="http://schemas.microsoft.com/office/drawing/2014/main" xmlns="" id="{8BB03EA0-A71F-AC4A-AB6F-D0574ED68F13}"/>
               </a:ext>
             </a:extLst>
           </p:cNvPr>
@@ -8115,114 +8344,6 @@
 </p:sld>
 </file>
 
-<file path=ppt/slides/slide17.xml><?xml version="1.0" encoding="utf-8"?>
-<p:sld xmlns:a="http://schemas.openxmlformats.org/drawingml/2006/main" xmlns:r="http://schemas.openxmlformats.org/officeDocument/2006/relationships" xmlns:p="http://schemas.openxmlformats.org/presentationml/2006/main">
-  <p:cSld>
-    <p:spTree>
-      <p:nvGrpSpPr>
-        <p:cNvPr id="1" name=""/>
-        <p:cNvGrpSpPr/>
-        <p:nvPr/>
-      </p:nvGrpSpPr>
-      <p:grpSpPr>
-        <a:xfrm>
-          <a:off x="0" y="0"/>
-          <a:ext cx="0" cy="0"/>
-          <a:chOff x="0" y="0"/>
-          <a:chExt cx="0" cy="0"/>
-        </a:xfrm>
-      </p:grpSpPr>
-      <p:sp>
-        <p:nvSpPr>
-          <p:cNvPr id="3" name="Content Placeholder 2">
-            <a:extLst>
-              <a:ext uri="{FF2B5EF4-FFF2-40B4-BE49-F238E27FC236}">
-                <a16:creationId xmlns:a16="http://schemas.microsoft.com/office/drawing/2014/main" id="{37BDBFE5-9D52-D74B-8382-14297D463301}"/>
-              </a:ext>
-            </a:extLst>
-          </p:cNvPr>
-          <p:cNvSpPr>
-            <a:spLocks noGrp="1"/>
-          </p:cNvSpPr>
-          <p:nvPr>
-            <p:ph idx="1"/>
-          </p:nvPr>
-        </p:nvSpPr>
-        <p:spPr>
-          <a:xfrm>
-            <a:off x="533400" y="562328"/>
-            <a:ext cx="11141149" cy="4346825"/>
-          </a:xfrm>
-        </p:spPr>
-        <p:txBody>
-          <a:bodyPr/>
-          <a:lstStyle/>
-          <a:p>
-            <a:r>
-              <a:rPr lang="en-US" dirty="0"/>
-              <a:t>Connect GND to the Negative Rail (Blue </a:t>
-            </a:r>
-            <a:r>
-              <a:rPr lang="en-US" b="1" dirty="0"/>
-              <a:t>– </a:t>
-            </a:r>
-            <a:r>
-              <a:rPr lang="en-US" dirty="0"/>
-              <a:t>on either side)</a:t>
-            </a:r>
-          </a:p>
-          <a:p>
-            <a:r>
-              <a:rPr lang="en-US" dirty="0"/>
-              <a:t>Press your buttons in to the bread board, ensure AB are on left &amp; CD are on right </a:t>
-            </a:r>
-          </a:p>
-          <a:p>
-            <a:r>
-              <a:rPr lang="en-US" dirty="0"/>
-              <a:t>Connect the left side of the switches (A) to the Negative rail with four male to male jumper wires.</a:t>
-            </a:r>
-          </a:p>
-          <a:p>
-            <a:r>
-              <a:rPr lang="en-US" dirty="0"/>
-              <a:t>Connect the right side of the switch to D2, D3, D4, and D5 respectively</a:t>
-            </a:r>
-          </a:p>
-          <a:p>
-            <a:r>
-              <a:rPr lang="en-US" dirty="0"/>
-              <a:t>(see all images in </a:t>
-            </a:r>
-            <a:r>
-              <a:rPr lang="en-US" dirty="0" err="1"/>
-              <a:t>github</a:t>
-            </a:r>
-            <a:r>
-              <a:rPr lang="en-US" dirty="0"/>
-              <a:t> repository for </a:t>
-            </a:r>
-            <a:r>
-              <a:rPr lang="en-US"/>
-              <a:t>additional info)</a:t>
-            </a:r>
-            <a:endParaRPr lang="en-US" dirty="0"/>
-          </a:p>
-        </p:txBody>
-      </p:sp>
-    </p:spTree>
-    <p:extLst>
-      <p:ext uri="{BB962C8B-B14F-4D97-AF65-F5344CB8AC3E}">
-        <p14:creationId xmlns:p14="http://schemas.microsoft.com/office/powerpoint/2010/main" val="2328744426"/>
-      </p:ext>
-    </p:extLst>
-  </p:cSld>
-  <p:clrMapOvr>
-    <a:masterClrMapping/>
-  </p:clrMapOvr>
-</p:sld>
-</file>
-
 <file path=ppt/slides/slide18.xml><?xml version="1.0" encoding="utf-8"?>
 <p:sld xmlns:a="http://schemas.openxmlformats.org/drawingml/2006/main" xmlns:r="http://schemas.openxmlformats.org/officeDocument/2006/relationships" xmlns:p="http://schemas.openxmlformats.org/presentationml/2006/main">
   <p:cSld>
@@ -8242,10 +8363,10 @@
       </p:grpSpPr>
       <p:sp>
         <p:nvSpPr>
-          <p:cNvPr id="2" name="Title 1">
+          <p:cNvPr id="3" name="Content Placeholder 2">
             <a:extLst>
               <a:ext uri="{FF2B5EF4-FFF2-40B4-BE49-F238E27FC236}">
-                <a16:creationId xmlns:a16="http://schemas.microsoft.com/office/drawing/2014/main" id="{3F40B394-692A-45F3-877D-FF21D4A59424}"/>
+                <a16:creationId xmlns:a16="http://schemas.microsoft.com/office/drawing/2014/main" xmlns="" id="{37BDBFE5-9D52-D74B-8382-14297D463301}"/>
               </a:ext>
             </a:extLst>
           </p:cNvPr>
@@ -8253,79 +8374,75 @@
             <a:spLocks noGrp="1"/>
           </p:cNvSpPr>
           <p:nvPr>
-            <p:ph type="title"/>
-          </p:nvPr>
-        </p:nvSpPr>
-        <p:spPr/>
+            <p:ph idx="1"/>
+          </p:nvPr>
+        </p:nvSpPr>
+        <p:spPr>
+          <a:xfrm>
+            <a:off x="533400" y="562328"/>
+            <a:ext cx="11141149" cy="4346825"/>
+          </a:xfrm>
+        </p:spPr>
         <p:txBody>
           <a:bodyPr/>
           <a:lstStyle/>
           <a:p>
             <a:r>
               <a:rPr lang="en-US" dirty="0"/>
-              <a:t>Program your board</a:t>
-            </a:r>
-          </a:p>
-        </p:txBody>
-      </p:sp>
-      <p:sp>
-        <p:nvSpPr>
-          <p:cNvPr id="3" name="Content Placeholder 2">
-            <a:extLst>
-              <a:ext uri="{FF2B5EF4-FFF2-40B4-BE49-F238E27FC236}">
-                <a16:creationId xmlns:a16="http://schemas.microsoft.com/office/drawing/2014/main" id="{7FD22553-7140-4EAE-A673-8F37562BCE27}"/>
-              </a:ext>
-            </a:extLst>
-          </p:cNvPr>
-          <p:cNvSpPr>
-            <a:spLocks noGrp="1"/>
-          </p:cNvSpPr>
-          <p:nvPr>
-            <p:ph idx="1"/>
-          </p:nvPr>
-        </p:nvSpPr>
-        <p:spPr/>
-        <p:txBody>
-          <a:bodyPr/>
-          <a:lstStyle/>
-          <a:p>
+              <a:t>Connect GND to the Negative Rail (Blue </a:t>
+            </a:r>
+            <a:r>
+              <a:rPr lang="en-US" b="1" dirty="0"/>
+              <a:t>– </a:t>
+            </a:r>
             <a:r>
               <a:rPr lang="en-US" dirty="0"/>
-              <a:t>Open </a:t>
+              <a:t>on either side)</a:t>
+            </a:r>
+          </a:p>
+          <a:p>
+            <a:r>
+              <a:rPr lang="en-US" dirty="0"/>
+              <a:t>Press your buttons in to the bread board, ensure AB are on left &amp; CD are on right </a:t>
+            </a:r>
+          </a:p>
+          <a:p>
+            <a:r>
+              <a:rPr lang="en-US" dirty="0"/>
+              <a:t>Connect the left side of the switches (A) to the Negative rail with four male to male jumper wires.</a:t>
+            </a:r>
+          </a:p>
+          <a:p>
+            <a:r>
+              <a:rPr lang="en-US" dirty="0"/>
+              <a:t>Connect the right side of the switch to D2, D3, D4, and D5 respectively</a:t>
+            </a:r>
+          </a:p>
+          <a:p>
+            <a:r>
+              <a:rPr lang="en-US" dirty="0"/>
+              <a:t>(see all images in </a:t>
             </a:r>
             <a:r>
               <a:rPr lang="en-US" dirty="0" err="1"/>
-              <a:t>Transmitter.ino</a:t>
+              <a:t>github</a:t>
             </a:r>
             <a:r>
               <a:rPr lang="en-US" dirty="0"/>
-              <a:t> and set your group number equal to </a:t>
-            </a:r>
-            <a:r>
-              <a:rPr lang="en-US" dirty="0" err="1"/>
-              <a:t>tableNumber</a:t>
-            </a:r>
-            <a:r>
-              <a:rPr lang="en-US" dirty="0"/>
-              <a:t>.</a:t>
-            </a:r>
-          </a:p>
-          <a:p>
-            <a:r>
-              <a:rPr lang="en-US" dirty="0"/>
-              <a:t>Compile the source and upload to </a:t>
+              <a:t> repository for </a:t>
             </a:r>
             <a:r>
               <a:rPr lang="en-US"/>
-              <a:t>your Arduino!</a:t>
-            </a:r>
+              <a:t>additional info)</a:t>
+            </a:r>
+            <a:endParaRPr lang="en-US" dirty="0"/>
           </a:p>
         </p:txBody>
       </p:sp>
     </p:spTree>
     <p:extLst>
       <p:ext uri="{BB962C8B-B14F-4D97-AF65-F5344CB8AC3E}">
-        <p14:creationId xmlns:p14="http://schemas.microsoft.com/office/powerpoint/2010/main" val="2215537048"/>
+        <p14:creationId xmlns:p14="http://schemas.microsoft.com/office/powerpoint/2010/main" val="2328744426"/>
       </p:ext>
     </p:extLst>
   </p:cSld>
@@ -8357,7 +8474,7 @@
           <p:cNvPr id="2" name="Title 1">
             <a:extLst>
               <a:ext uri="{FF2B5EF4-FFF2-40B4-BE49-F238E27FC236}">
-                <a16:creationId xmlns:a16="http://schemas.microsoft.com/office/drawing/2014/main" id="{F2CAF56E-301D-493F-8850-E0E1A39A92B5}"/>
+                <a16:creationId xmlns:a16="http://schemas.microsoft.com/office/drawing/2014/main" xmlns="" id="{3F40B394-692A-45F3-877D-FF21D4A59424}"/>
               </a:ext>
             </a:extLst>
           </p:cNvPr>
@@ -8375,7 +8492,7 @@
           <a:p>
             <a:r>
               <a:rPr lang="en-US" dirty="0"/>
-              <a:t>What happened?</a:t>
+              <a:t>Program your board</a:t>
             </a:r>
           </a:p>
         </p:txBody>
@@ -8385,7 +8502,7 @@
           <p:cNvPr id="3" name="Content Placeholder 2">
             <a:extLst>
               <a:ext uri="{FF2B5EF4-FFF2-40B4-BE49-F238E27FC236}">
-                <a16:creationId xmlns:a16="http://schemas.microsoft.com/office/drawing/2014/main" id="{F8204248-8B2E-4474-BDB9-8E5DA663C7A2}"/>
+                <a16:creationId xmlns:a16="http://schemas.microsoft.com/office/drawing/2014/main" xmlns="" id="{7FD22553-7140-4EAE-A673-8F37562BCE27}"/>
               </a:ext>
             </a:extLst>
           </p:cNvPr>
@@ -8401,14 +8518,43 @@
           <a:bodyPr/>
           <a:lstStyle/>
           <a:p>
-            <a:endParaRPr lang="en-US" dirty="0"/>
+            <a:r>
+              <a:rPr lang="en-US" dirty="0"/>
+              <a:t>Open </a:t>
+            </a:r>
+            <a:r>
+              <a:rPr lang="en-US" dirty="0" err="1"/>
+              <a:t>Transmitter.ino</a:t>
+            </a:r>
+            <a:r>
+              <a:rPr lang="en-US" dirty="0"/>
+              <a:t> and set your group number equal to </a:t>
+            </a:r>
+            <a:r>
+              <a:rPr lang="en-US" dirty="0" err="1"/>
+              <a:t>tableNumber</a:t>
+            </a:r>
+            <a:r>
+              <a:rPr lang="en-US" dirty="0"/>
+              <a:t>.</a:t>
+            </a:r>
+          </a:p>
+          <a:p>
+            <a:r>
+              <a:rPr lang="en-US" dirty="0"/>
+              <a:t>Compile the source and upload to </a:t>
+            </a:r>
+            <a:r>
+              <a:rPr lang="en-US"/>
+              <a:t>your Arduino!</a:t>
+            </a:r>
           </a:p>
         </p:txBody>
       </p:sp>
     </p:spTree>
     <p:extLst>
       <p:ext uri="{BB962C8B-B14F-4D97-AF65-F5344CB8AC3E}">
-        <p14:creationId xmlns:p14="http://schemas.microsoft.com/office/powerpoint/2010/main" val="934202066"/>
+        <p14:creationId xmlns:p14="http://schemas.microsoft.com/office/powerpoint/2010/main" val="2215537048"/>
       </p:ext>
     </p:extLst>
   </p:cSld>
@@ -8440,7 +8586,7 @@
           <p:cNvPr id="13" name="Picture 12">
             <a:extLst>
               <a:ext uri="{FF2B5EF4-FFF2-40B4-BE49-F238E27FC236}">
-                <a16:creationId xmlns:a16="http://schemas.microsoft.com/office/drawing/2014/main" id="{6FD8462F-474D-4270-B8BA-33F26C2FFF21}"/>
+                <a16:creationId xmlns:a16="http://schemas.microsoft.com/office/drawing/2014/main" xmlns="" id="{6FD8462F-474D-4270-B8BA-33F26C2FFF21}"/>
               </a:ext>
             </a:extLst>
           </p:cNvPr>
@@ -8476,7 +8622,7 @@
           <p:cNvPr id="3" name="Title 2">
             <a:extLst>
               <a:ext uri="{FF2B5EF4-FFF2-40B4-BE49-F238E27FC236}">
-                <a16:creationId xmlns:a16="http://schemas.microsoft.com/office/drawing/2014/main" id="{FDF58119-C7C8-4236-B437-7333A1D7FF5C}"/>
+                <a16:creationId xmlns:a16="http://schemas.microsoft.com/office/drawing/2014/main" xmlns="" id="{FDF58119-C7C8-4236-B437-7333A1D7FF5C}"/>
               </a:ext>
             </a:extLst>
           </p:cNvPr>
@@ -8509,7 +8655,7 @@
           <p:cNvPr id="6" name="Content Placeholder 5">
             <a:extLst>
               <a:ext uri="{FF2B5EF4-FFF2-40B4-BE49-F238E27FC236}">
-                <a16:creationId xmlns:a16="http://schemas.microsoft.com/office/drawing/2014/main" id="{6D0A0543-7550-40FC-9F4F-4887CA90BB46}"/>
+                <a16:creationId xmlns:a16="http://schemas.microsoft.com/office/drawing/2014/main" xmlns="" id="{6D0A0543-7550-40FC-9F4F-4887CA90BB46}"/>
               </a:ext>
             </a:extLst>
           </p:cNvPr>
@@ -8544,7 +8690,7 @@
           <p:cNvPr id="2" name="Slide Number Placeholder 1">
             <a:extLst>
               <a:ext uri="{FF2B5EF4-FFF2-40B4-BE49-F238E27FC236}">
-                <a16:creationId xmlns:a16="http://schemas.microsoft.com/office/drawing/2014/main" id="{49B152A8-EF71-42D1-8DE2-D02867DCB6C7}"/>
+                <a16:creationId xmlns:a16="http://schemas.microsoft.com/office/drawing/2014/main" xmlns="" id="{49B152A8-EF71-42D1-8DE2-D02867DCB6C7}"/>
               </a:ext>
             </a:extLst>
           </p:cNvPr>
@@ -8578,7 +8724,7 @@
           <p:cNvPr id="8" name="Picture 7">
             <a:extLst>
               <a:ext uri="{FF2B5EF4-FFF2-40B4-BE49-F238E27FC236}">
-                <a16:creationId xmlns:a16="http://schemas.microsoft.com/office/drawing/2014/main" id="{60C25D76-3984-4773-919B-E7693091EB22}"/>
+                <a16:creationId xmlns:a16="http://schemas.microsoft.com/office/drawing/2014/main" xmlns="" id="{60C25D76-3984-4773-919B-E7693091EB22}"/>
               </a:ext>
             </a:extLst>
           </p:cNvPr>
@@ -8614,7 +8760,7 @@
           <p:cNvPr id="11" name="TextBox 10">
             <a:extLst>
               <a:ext uri="{FF2B5EF4-FFF2-40B4-BE49-F238E27FC236}">
-                <a16:creationId xmlns:a16="http://schemas.microsoft.com/office/drawing/2014/main" id="{00ECA2BE-B62B-4044-BCA6-2E786FB4F939}"/>
+                <a16:creationId xmlns:a16="http://schemas.microsoft.com/office/drawing/2014/main" xmlns="" id="{00ECA2BE-B62B-4044-BCA6-2E786FB4F939}"/>
               </a:ext>
             </a:extLst>
           </p:cNvPr>
@@ -8683,7 +8829,7 @@
           <p:cNvPr id="2" name="Title 1">
             <a:extLst>
               <a:ext uri="{FF2B5EF4-FFF2-40B4-BE49-F238E27FC236}">
-                <a16:creationId xmlns:a16="http://schemas.microsoft.com/office/drawing/2014/main" id="{FA468998-41EC-4C02-A264-B5A8699B69E4}"/>
+                <a16:creationId xmlns:a16="http://schemas.microsoft.com/office/drawing/2014/main" xmlns="" id="{F2CAF56E-301D-493F-8850-E0E1A39A92B5}"/>
               </a:ext>
             </a:extLst>
           </p:cNvPr>
@@ -8701,7 +8847,7 @@
           <a:p>
             <a:r>
               <a:rPr lang="en-US" dirty="0"/>
-              <a:t>Root Cause Analysis</a:t>
+              <a:t>What happened?</a:t>
             </a:r>
           </a:p>
         </p:txBody>
@@ -8711,7 +8857,7 @@
           <p:cNvPr id="3" name="Content Placeholder 2">
             <a:extLst>
               <a:ext uri="{FF2B5EF4-FFF2-40B4-BE49-F238E27FC236}">
-                <a16:creationId xmlns:a16="http://schemas.microsoft.com/office/drawing/2014/main" id="{5ABEC96E-0D10-41E5-B60F-F4F91643F1CE}"/>
+                <a16:creationId xmlns:a16="http://schemas.microsoft.com/office/drawing/2014/main" xmlns="" id="{F8204248-8B2E-4474-BDB9-8E5DA663C7A2}"/>
               </a:ext>
             </a:extLst>
           </p:cNvPr>
@@ -8727,15 +8873,6 @@
           <a:bodyPr/>
           <a:lstStyle/>
           <a:p>
-            <a:r>
-              <a:rPr lang="en-US" dirty="0"/>
-              <a:t>When programming Team 6’s board, I remember turning to them and saying “It’s funny that you’re team 6 and the device mounted as COM6.”  After programming their board, I handed the device to them and couldn’t figure out why I wasn’t receiving any responses.  During the tests, I never noticed that COM6 was still connected – meaning, I was using the transmission file to receive. </a:t>
-            </a:r>
-          </a:p>
-          <a:p>
-            <a:pPr marL="0" indent="0">
-              <a:buNone/>
-            </a:pPr>
             <a:endParaRPr lang="en-US" dirty="0"/>
           </a:p>
         </p:txBody>
@@ -8743,7 +8880,7 @@
     </p:spTree>
     <p:extLst>
       <p:ext uri="{BB962C8B-B14F-4D97-AF65-F5344CB8AC3E}">
-        <p14:creationId xmlns:p14="http://schemas.microsoft.com/office/powerpoint/2010/main" val="1185372471"/>
+        <p14:creationId xmlns:p14="http://schemas.microsoft.com/office/powerpoint/2010/main" val="934202066"/>
       </p:ext>
     </p:extLst>
   </p:cSld>
@@ -8775,7 +8912,7 @@
           <p:cNvPr id="2" name="Title 1">
             <a:extLst>
               <a:ext uri="{FF2B5EF4-FFF2-40B4-BE49-F238E27FC236}">
-                <a16:creationId xmlns:a16="http://schemas.microsoft.com/office/drawing/2014/main" id="{D21755B9-F390-451F-8215-5972F790CD75}"/>
+                <a16:creationId xmlns:a16="http://schemas.microsoft.com/office/drawing/2014/main" xmlns="" id="{FA468998-41EC-4C02-A264-B5A8699B69E4}"/>
               </a:ext>
             </a:extLst>
           </p:cNvPr>
@@ -8793,7 +8930,7 @@
           <a:p>
             <a:r>
               <a:rPr lang="en-US" dirty="0"/>
-              <a:t>Transmission Bugs</a:t>
+              <a:t>Root Cause Analysis</a:t>
             </a:r>
           </a:p>
         </p:txBody>
@@ -8803,7 +8940,7 @@
           <p:cNvPr id="3" name="Content Placeholder 2">
             <a:extLst>
               <a:ext uri="{FF2B5EF4-FFF2-40B4-BE49-F238E27FC236}">
-                <a16:creationId xmlns:a16="http://schemas.microsoft.com/office/drawing/2014/main" id="{F6F81189-C7CC-4573-839F-ADDAC433F79B}"/>
+                <a16:creationId xmlns:a16="http://schemas.microsoft.com/office/drawing/2014/main" xmlns="" id="{5ABEC96E-0D10-41E5-B60F-F4F91643F1CE}"/>
               </a:ext>
             </a:extLst>
           </p:cNvPr>
@@ -8821,22 +8958,13 @@
           <a:p>
             <a:r>
               <a:rPr lang="en-US" dirty="0"/>
-              <a:t>Previously, the code was resetting the table to be “1” regardless of the entered value.  </a:t>
-            </a:r>
-          </a:p>
-          <a:p>
-            <a:r>
-              <a:rPr lang="en-US" dirty="0"/>
-              <a:t>We were setting a hard integer in the type definition – you don’t do this generally when you have a reusable data type.</a:t>
-            </a:r>
-          </a:p>
-          <a:p>
-            <a:r>
-              <a:rPr lang="en-US" dirty="0"/>
-              <a:t>Too many messages in the debug log making it difficult to read. </a:t>
-            </a:r>
-          </a:p>
-          <a:p>
+              <a:t>When programming Team 6’s board, I remember turning to them and saying “It’s funny that you’re team 6 and the device mounted as COM6.”  After programming their board, I handed the device to them and couldn’t figure out why I wasn’t receiving any responses.  During the tests, I never noticed that COM6 was still connected – meaning, I was using the transmission file to receive. </a:t>
+            </a:r>
+          </a:p>
+          <a:p>
+            <a:pPr marL="0" indent="0">
+              <a:buNone/>
+            </a:pPr>
             <a:endParaRPr lang="en-US" dirty="0"/>
           </a:p>
         </p:txBody>
@@ -8844,7 +8972,7 @@
     </p:spTree>
     <p:extLst>
       <p:ext uri="{BB962C8B-B14F-4D97-AF65-F5344CB8AC3E}">
-        <p14:creationId xmlns:p14="http://schemas.microsoft.com/office/powerpoint/2010/main" val="3046616262"/>
+        <p14:creationId xmlns:p14="http://schemas.microsoft.com/office/powerpoint/2010/main" val="1185372471"/>
       </p:ext>
     </p:extLst>
   </p:cSld>
@@ -8876,7 +9004,7 @@
           <p:cNvPr id="2" name="Title 1">
             <a:extLst>
               <a:ext uri="{FF2B5EF4-FFF2-40B4-BE49-F238E27FC236}">
-                <a16:creationId xmlns:a16="http://schemas.microsoft.com/office/drawing/2014/main" id="{BA43DDEB-0188-4CA0-84FA-3802C42BF0FF}"/>
+                <a16:creationId xmlns:a16="http://schemas.microsoft.com/office/drawing/2014/main" xmlns="" id="{D21755B9-F390-451F-8215-5972F790CD75}"/>
               </a:ext>
             </a:extLst>
           </p:cNvPr>
@@ -8894,7 +9022,7 @@
           <a:p>
             <a:r>
               <a:rPr lang="en-US" dirty="0"/>
-              <a:t>Receive Bugs</a:t>
+              <a:t>Transmission Bugs</a:t>
             </a:r>
           </a:p>
         </p:txBody>
@@ -8904,7 +9032,7 @@
           <p:cNvPr id="3" name="Content Placeholder 2">
             <a:extLst>
               <a:ext uri="{FF2B5EF4-FFF2-40B4-BE49-F238E27FC236}">
-                <a16:creationId xmlns:a16="http://schemas.microsoft.com/office/drawing/2014/main" id="{E19997C4-BF13-44A6-A2B0-85CB8E21F519}"/>
+                <a16:creationId xmlns:a16="http://schemas.microsoft.com/office/drawing/2014/main" xmlns="" id="{F6F81189-C7CC-4573-839F-ADDAC433F79B}"/>
               </a:ext>
             </a:extLst>
           </p:cNvPr>
@@ -8922,27 +9050,30 @@
           <a:p>
             <a:r>
               <a:rPr lang="en-US" dirty="0"/>
-              <a:t>Massively cleaned up the code to be one simple line instead of a huge if then block</a:t>
+              <a:t>Previously, the code was resetting the table to be “1” regardless of the entered value.  </a:t>
             </a:r>
           </a:p>
           <a:p>
             <a:r>
               <a:rPr lang="en-US" dirty="0"/>
-              <a:t>Updated the transmission ports to Node to match the actual table numbers (1-10).  </a:t>
+              <a:t>We were setting a hard integer in the type definition – you don’t do this generally when you have a reusable data type.</a:t>
             </a:r>
           </a:p>
           <a:p>
             <a:r>
               <a:rPr lang="en-US" dirty="0"/>
-              <a:t>Removed code that looked for different transmission channels (not needed)</a:t>
-            </a:r>
+              <a:t>Too many messages in the debug log making it difficult to read. </a:t>
+            </a:r>
+          </a:p>
+          <a:p>
+            <a:endParaRPr lang="en-US" dirty="0"/>
           </a:p>
         </p:txBody>
       </p:sp>
     </p:spTree>
     <p:extLst>
       <p:ext uri="{BB962C8B-B14F-4D97-AF65-F5344CB8AC3E}">
-        <p14:creationId xmlns:p14="http://schemas.microsoft.com/office/powerpoint/2010/main" val="2188546255"/>
+        <p14:creationId xmlns:p14="http://schemas.microsoft.com/office/powerpoint/2010/main" val="3046616262"/>
       </p:ext>
     </p:extLst>
   </p:cSld>
@@ -8974,7 +9105,7 @@
           <p:cNvPr id="2" name="Title 1">
             <a:extLst>
               <a:ext uri="{FF2B5EF4-FFF2-40B4-BE49-F238E27FC236}">
-                <a16:creationId xmlns:a16="http://schemas.microsoft.com/office/drawing/2014/main" id="{00ADCF26-B30A-4F64-9B4B-3E4F8BE5A9E1}"/>
+                <a16:creationId xmlns:a16="http://schemas.microsoft.com/office/drawing/2014/main" xmlns="" id="{BA43DDEB-0188-4CA0-84FA-3802C42BF0FF}"/>
               </a:ext>
             </a:extLst>
           </p:cNvPr>
@@ -8992,7 +9123,7 @@
           <a:p>
             <a:r>
               <a:rPr lang="en-US" dirty="0"/>
-              <a:t>Web App Bugs </a:t>
+              <a:t>Receive Bugs</a:t>
             </a:r>
           </a:p>
         </p:txBody>
@@ -9002,7 +9133,7 @@
           <p:cNvPr id="3" name="Content Placeholder 2">
             <a:extLst>
               <a:ext uri="{FF2B5EF4-FFF2-40B4-BE49-F238E27FC236}">
-                <a16:creationId xmlns:a16="http://schemas.microsoft.com/office/drawing/2014/main" id="{CFA05BC5-8681-4F51-9C8B-0797E6AC1F64}"/>
+                <a16:creationId xmlns:a16="http://schemas.microsoft.com/office/drawing/2014/main" xmlns="" id="{E19997C4-BF13-44A6-A2B0-85CB8E21F519}"/>
               </a:ext>
             </a:extLst>
           </p:cNvPr>
@@ -9020,25 +9151,19 @@
           <a:p>
             <a:r>
               <a:rPr lang="en-US" dirty="0"/>
-              <a:t>Fixed the spacing issues in the code that would have made it unusable on 1920x1080</a:t>
+              <a:t>Massively cleaned up the code to be one simple line instead of a huge if then block</a:t>
             </a:r>
           </a:p>
           <a:p>
             <a:r>
               <a:rPr lang="en-US" dirty="0"/>
-              <a:t>Fixed the team names so that they match the correct groups</a:t>
+              <a:t>Updated the transmission ports to Node to match the actual table numbers (1-10).  </a:t>
             </a:r>
           </a:p>
           <a:p>
             <a:r>
               <a:rPr lang="en-US" dirty="0"/>
-              <a:t>Fixed the random linear display bug (lack of a table)</a:t>
-            </a:r>
-          </a:p>
-          <a:p>
-            <a:r>
-              <a:rPr lang="en-US" dirty="0"/>
-              <a:t>Fixed the transmit variables</a:t>
+              <a:t>Removed code that looked for different transmission channels (not needed)</a:t>
             </a:r>
           </a:p>
         </p:txBody>
@@ -9046,7 +9171,7 @@
     </p:spTree>
     <p:extLst>
       <p:ext uri="{BB962C8B-B14F-4D97-AF65-F5344CB8AC3E}">
-        <p14:creationId xmlns:p14="http://schemas.microsoft.com/office/powerpoint/2010/main" val="2600142789"/>
+        <p14:creationId xmlns:p14="http://schemas.microsoft.com/office/powerpoint/2010/main" val="2188546255"/>
       </p:ext>
     </p:extLst>
   </p:cSld>
@@ -9078,7 +9203,7 @@
           <p:cNvPr id="2" name="Title 1">
             <a:extLst>
               <a:ext uri="{FF2B5EF4-FFF2-40B4-BE49-F238E27FC236}">
-                <a16:creationId xmlns:a16="http://schemas.microsoft.com/office/drawing/2014/main" id="{5FD64688-DF9B-4E69-9053-5C7C375E89E5}"/>
+                <a16:creationId xmlns:a16="http://schemas.microsoft.com/office/drawing/2014/main" xmlns="" id="{00ADCF26-B30A-4F64-9B4B-3E4F8BE5A9E1}"/>
               </a:ext>
             </a:extLst>
           </p:cNvPr>
@@ -9089,19 +9214,14 @@
             <p:ph type="title"/>
           </p:nvPr>
         </p:nvSpPr>
-        <p:spPr>
-          <a:xfrm>
-            <a:off x="533400" y="222086"/>
-            <a:ext cx="10091484" cy="914400"/>
-          </a:xfrm>
-        </p:spPr>
+        <p:spPr/>
         <p:txBody>
           <a:bodyPr/>
           <a:lstStyle/>
           <a:p>
             <a:r>
               <a:rPr lang="en-US" dirty="0"/>
-              <a:t>Bad code</a:t>
+              <a:t>Web App Bugs </a:t>
             </a:r>
           </a:p>
         </p:txBody>
@@ -9111,7 +9231,7 @@
           <p:cNvPr id="3" name="Content Placeholder 2">
             <a:extLst>
               <a:ext uri="{FF2B5EF4-FFF2-40B4-BE49-F238E27FC236}">
-                <a16:creationId xmlns:a16="http://schemas.microsoft.com/office/drawing/2014/main" id="{E9B359CB-DB15-4A77-B5DD-77E13E0CE3DA}"/>
+                <a16:creationId xmlns:a16="http://schemas.microsoft.com/office/drawing/2014/main" xmlns="" id="{CFA05BC5-8681-4F51-9C8B-0797E6AC1F64}"/>
               </a:ext>
             </a:extLst>
           </p:cNvPr>
@@ -9127,54 +9247,35 @@
           <a:bodyPr/>
           <a:lstStyle/>
           <a:p>
-            <a:pPr marL="0" indent="0">
-              <a:buNone/>
-            </a:pPr>
             <a:r>
               <a:rPr lang="en-US" dirty="0"/>
-              <a:t>struct dataStruct1 {</a:t>
-            </a:r>
-            <a:br>
+              <a:t>Fixed the spacing issues in the code that would have made it unusable on 1920x1080</a:t>
+            </a:r>
+          </a:p>
+          <a:p>
+            <a:r>
               <a:rPr lang="en-US" dirty="0"/>
-            </a:br>
+              <a:t>Fixed the team names so that they match the correct groups</a:t>
+            </a:r>
+          </a:p>
+          <a:p>
             <a:r>
               <a:rPr lang="en-US" dirty="0"/>
-              <a:t>  int table = 6;</a:t>
-            </a:r>
-            <a:br>
+              <a:t>Fixed the random linear display bug (lack of a table)</a:t>
+            </a:r>
+          </a:p>
+          <a:p>
+            <a:r>
               <a:rPr lang="en-US" dirty="0"/>
-            </a:br>
-            <a:r>
-              <a:rPr lang="en-US" dirty="0"/>
-              <a:t>  float t1;</a:t>
-            </a:r>
-            <a:br>
-              <a:rPr lang="en-US" dirty="0"/>
-            </a:br>
-            <a:r>
-              <a:rPr lang="en-US" dirty="0"/>
-              <a:t>  char response;</a:t>
-            </a:r>
-            <a:br>
-              <a:rPr lang="en-US" dirty="0"/>
-            </a:br>
-            <a:r>
-              <a:rPr lang="en-US" dirty="0"/>
-              <a:t>} transmitter1_data;</a:t>
-            </a:r>
-          </a:p>
-          <a:p>
-            <a:pPr marL="0" indent="0">
-              <a:buNone/>
-            </a:pPr>
-            <a:endParaRPr lang="en-US" dirty="0"/>
+              <a:t>Fixed the transmit variables</a:t>
+            </a:r>
           </a:p>
         </p:txBody>
       </p:sp>
     </p:spTree>
     <p:extLst>
       <p:ext uri="{BB962C8B-B14F-4D97-AF65-F5344CB8AC3E}">
-        <p14:creationId xmlns:p14="http://schemas.microsoft.com/office/powerpoint/2010/main" val="2782965308"/>
+        <p14:creationId xmlns:p14="http://schemas.microsoft.com/office/powerpoint/2010/main" val="2600142789"/>
       </p:ext>
     </p:extLst>
   </p:cSld>
@@ -9206,7 +9307,7 @@
           <p:cNvPr id="2" name="Title 1">
             <a:extLst>
               <a:ext uri="{FF2B5EF4-FFF2-40B4-BE49-F238E27FC236}">
-                <a16:creationId xmlns:a16="http://schemas.microsoft.com/office/drawing/2014/main" id="{C4C65BFE-2141-488B-8A55-06001A92C69B}"/>
+                <a16:creationId xmlns:a16="http://schemas.microsoft.com/office/drawing/2014/main" xmlns="" id="{5FD64688-DF9B-4E69-9053-5C7C375E89E5}"/>
               </a:ext>
             </a:extLst>
           </p:cNvPr>
@@ -9217,14 +9318,19 @@
             <p:ph type="title"/>
           </p:nvPr>
         </p:nvSpPr>
-        <p:spPr/>
+        <p:spPr>
+          <a:xfrm>
+            <a:off x="533400" y="222086"/>
+            <a:ext cx="10091484" cy="914400"/>
+          </a:xfrm>
+        </p:spPr>
         <p:txBody>
           <a:bodyPr/>
           <a:lstStyle/>
           <a:p>
             <a:r>
               <a:rPr lang="en-US" dirty="0"/>
-              <a:t>Code walkthrough</a:t>
+              <a:t>Bad code</a:t>
             </a:r>
           </a:p>
         </p:txBody>
@@ -9234,7 +9340,7 @@
           <p:cNvPr id="3" name="Content Placeholder 2">
             <a:extLst>
               <a:ext uri="{FF2B5EF4-FFF2-40B4-BE49-F238E27FC236}">
-                <a16:creationId xmlns:a16="http://schemas.microsoft.com/office/drawing/2014/main" id="{7C4E55DB-AC9E-48AD-8FB8-45B47FA5CCF2}"/>
+                <a16:creationId xmlns:a16="http://schemas.microsoft.com/office/drawing/2014/main" xmlns="" id="{E9B359CB-DB15-4A77-B5DD-77E13E0CE3DA}"/>
               </a:ext>
             </a:extLst>
           </p:cNvPr>
@@ -9250,6 +9356,46 @@
           <a:bodyPr/>
           <a:lstStyle/>
           <a:p>
+            <a:pPr marL="0" indent="0">
+              <a:buNone/>
+            </a:pPr>
+            <a:r>
+              <a:rPr lang="en-US" dirty="0"/>
+              <a:t>struct dataStruct1 {</a:t>
+            </a:r>
+            <a:br>
+              <a:rPr lang="en-US" dirty="0"/>
+            </a:br>
+            <a:r>
+              <a:rPr lang="en-US" dirty="0"/>
+              <a:t>  int table = 6;</a:t>
+            </a:r>
+            <a:br>
+              <a:rPr lang="en-US" dirty="0"/>
+            </a:br>
+            <a:r>
+              <a:rPr lang="en-US" dirty="0"/>
+              <a:t>  float t1;</a:t>
+            </a:r>
+            <a:br>
+              <a:rPr lang="en-US" dirty="0"/>
+            </a:br>
+            <a:r>
+              <a:rPr lang="en-US" dirty="0"/>
+              <a:t>  char response;</a:t>
+            </a:r>
+            <a:br>
+              <a:rPr lang="en-US" dirty="0"/>
+            </a:br>
+            <a:r>
+              <a:rPr lang="en-US" dirty="0"/>
+              <a:t>} transmitter1_data;</a:t>
+            </a:r>
+          </a:p>
+          <a:p>
+            <a:pPr marL="0" indent="0">
+              <a:buNone/>
+            </a:pPr>
             <a:endParaRPr lang="en-US" dirty="0"/>
           </a:p>
         </p:txBody>
@@ -9257,7 +9403,7 @@
     </p:spTree>
     <p:extLst>
       <p:ext uri="{BB962C8B-B14F-4D97-AF65-F5344CB8AC3E}">
-        <p14:creationId xmlns:p14="http://schemas.microsoft.com/office/powerpoint/2010/main" val="482681365"/>
+        <p14:creationId xmlns:p14="http://schemas.microsoft.com/office/powerpoint/2010/main" val="2782965308"/>
       </p:ext>
     </p:extLst>
   </p:cSld>
@@ -9289,7 +9435,7 @@
           <p:cNvPr id="2" name="Title 1">
             <a:extLst>
               <a:ext uri="{FF2B5EF4-FFF2-40B4-BE49-F238E27FC236}">
-                <a16:creationId xmlns:a16="http://schemas.microsoft.com/office/drawing/2014/main" id="{98D6C60A-0731-4E9D-82EF-4C2C3B1605C4}"/>
+                <a16:creationId xmlns:a16="http://schemas.microsoft.com/office/drawing/2014/main" xmlns="" id="{C4C65BFE-2141-488B-8A55-06001A92C69B}"/>
               </a:ext>
             </a:extLst>
           </p:cNvPr>
@@ -9307,7 +9453,7 @@
           <a:p>
             <a:r>
               <a:rPr lang="en-US" dirty="0"/>
-              <a:t>Connect with me!</a:t>
+              <a:t>Code walkthrough</a:t>
             </a:r>
           </a:p>
         </p:txBody>
@@ -9317,7 +9463,90 @@
           <p:cNvPr id="3" name="Content Placeholder 2">
             <a:extLst>
               <a:ext uri="{FF2B5EF4-FFF2-40B4-BE49-F238E27FC236}">
-                <a16:creationId xmlns:a16="http://schemas.microsoft.com/office/drawing/2014/main" id="{402CA226-6525-437B-88B4-0AD9A4B24A0E}"/>
+                <a16:creationId xmlns:a16="http://schemas.microsoft.com/office/drawing/2014/main" xmlns="" id="{7C4E55DB-AC9E-48AD-8FB8-45B47FA5CCF2}"/>
+              </a:ext>
+            </a:extLst>
+          </p:cNvPr>
+          <p:cNvSpPr>
+            <a:spLocks noGrp="1"/>
+          </p:cNvSpPr>
+          <p:nvPr>
+            <p:ph idx="1"/>
+          </p:nvPr>
+        </p:nvSpPr>
+        <p:spPr/>
+        <p:txBody>
+          <a:bodyPr/>
+          <a:lstStyle/>
+          <a:p>
+            <a:endParaRPr lang="en-US" dirty="0"/>
+          </a:p>
+        </p:txBody>
+      </p:sp>
+    </p:spTree>
+    <p:extLst>
+      <p:ext uri="{BB962C8B-B14F-4D97-AF65-F5344CB8AC3E}">
+        <p14:creationId xmlns:p14="http://schemas.microsoft.com/office/powerpoint/2010/main" val="482681365"/>
+      </p:ext>
+    </p:extLst>
+  </p:cSld>
+  <p:clrMapOvr>
+    <a:masterClrMapping/>
+  </p:clrMapOvr>
+</p:sld>
+</file>
+
+<file path=ppt/slides/slide27.xml><?xml version="1.0" encoding="utf-8"?>
+<p:sld xmlns:a="http://schemas.openxmlformats.org/drawingml/2006/main" xmlns:r="http://schemas.openxmlformats.org/officeDocument/2006/relationships" xmlns:p="http://schemas.openxmlformats.org/presentationml/2006/main">
+  <p:cSld>
+    <p:spTree>
+      <p:nvGrpSpPr>
+        <p:cNvPr id="1" name=""/>
+        <p:cNvGrpSpPr/>
+        <p:nvPr/>
+      </p:nvGrpSpPr>
+      <p:grpSpPr>
+        <a:xfrm>
+          <a:off x="0" y="0"/>
+          <a:ext cx="0" cy="0"/>
+          <a:chOff x="0" y="0"/>
+          <a:chExt cx="0" cy="0"/>
+        </a:xfrm>
+      </p:grpSpPr>
+      <p:sp>
+        <p:nvSpPr>
+          <p:cNvPr id="2" name="Title 1">
+            <a:extLst>
+              <a:ext uri="{FF2B5EF4-FFF2-40B4-BE49-F238E27FC236}">
+                <a16:creationId xmlns:a16="http://schemas.microsoft.com/office/drawing/2014/main" xmlns="" id="{98D6C60A-0731-4E9D-82EF-4C2C3B1605C4}"/>
+              </a:ext>
+            </a:extLst>
+          </p:cNvPr>
+          <p:cNvSpPr>
+            <a:spLocks noGrp="1"/>
+          </p:cNvSpPr>
+          <p:nvPr>
+            <p:ph type="title"/>
+          </p:nvPr>
+        </p:nvSpPr>
+        <p:spPr/>
+        <p:txBody>
+          <a:bodyPr/>
+          <a:lstStyle/>
+          <a:p>
+            <a:r>
+              <a:rPr lang="en-US" dirty="0"/>
+              <a:t>Connect with me!</a:t>
+            </a:r>
+          </a:p>
+        </p:txBody>
+      </p:sp>
+      <p:sp>
+        <p:nvSpPr>
+          <p:cNvPr id="3" name="Content Placeholder 2">
+            <a:extLst>
+              <a:ext uri="{FF2B5EF4-FFF2-40B4-BE49-F238E27FC236}">
+                <a16:creationId xmlns:a16="http://schemas.microsoft.com/office/drawing/2014/main" xmlns="" id="{402CA226-6525-437B-88B4-0AD9A4B24A0E}"/>
               </a:ext>
             </a:extLst>
           </p:cNvPr>
@@ -9390,7 +9619,7 @@
           <p:cNvPr id="2" name="Title 1">
             <a:extLst>
               <a:ext uri="{FF2B5EF4-FFF2-40B4-BE49-F238E27FC236}">
-                <a16:creationId xmlns:a16="http://schemas.microsoft.com/office/drawing/2014/main" id="{80650DDE-FB1C-45C4-BCEA-56C9797C32CC}"/>
+                <a16:creationId xmlns:a16="http://schemas.microsoft.com/office/drawing/2014/main" xmlns="" id="{80650DDE-FB1C-45C4-BCEA-56C9797C32CC}"/>
               </a:ext>
             </a:extLst>
           </p:cNvPr>
@@ -9418,7 +9647,7 @@
           <p:cNvPr id="5" name="Content Placeholder 4">
             <a:extLst>
               <a:ext uri="{FF2B5EF4-FFF2-40B4-BE49-F238E27FC236}">
-                <a16:creationId xmlns:a16="http://schemas.microsoft.com/office/drawing/2014/main" id="{71100CFA-1A50-463F-B170-CC3CB5B3E0EA}"/>
+                <a16:creationId xmlns:a16="http://schemas.microsoft.com/office/drawing/2014/main" xmlns="" id="{71100CFA-1A50-463F-B170-CC3CB5B3E0EA}"/>
               </a:ext>
             </a:extLst>
           </p:cNvPr>
@@ -9483,7 +9712,7 @@
           <p:cNvPr id="2" name="Title 1">
             <a:extLst>
               <a:ext uri="{FF2B5EF4-FFF2-40B4-BE49-F238E27FC236}">
-                <a16:creationId xmlns:a16="http://schemas.microsoft.com/office/drawing/2014/main" id="{4A871215-8A33-4F71-8C80-E267BEBB759B}"/>
+                <a16:creationId xmlns:a16="http://schemas.microsoft.com/office/drawing/2014/main" xmlns="" id="{4A871215-8A33-4F71-8C80-E267BEBB759B}"/>
               </a:ext>
             </a:extLst>
           </p:cNvPr>
@@ -9511,7 +9740,7 @@
           <p:cNvPr id="5" name="Content Placeholder 4">
             <a:extLst>
               <a:ext uri="{FF2B5EF4-FFF2-40B4-BE49-F238E27FC236}">
-                <a16:creationId xmlns:a16="http://schemas.microsoft.com/office/drawing/2014/main" id="{219D581F-0A1D-49C1-B84E-EF9019CE74AB}"/>
+                <a16:creationId xmlns:a16="http://schemas.microsoft.com/office/drawing/2014/main" xmlns="" id="{219D581F-0A1D-49C1-B84E-EF9019CE74AB}"/>
               </a:ext>
             </a:extLst>
           </p:cNvPr>
@@ -9546,7 +9775,7 @@
           <p:cNvPr id="7" name="Picture 6">
             <a:extLst>
               <a:ext uri="{FF2B5EF4-FFF2-40B4-BE49-F238E27FC236}">
-                <a16:creationId xmlns:a16="http://schemas.microsoft.com/office/drawing/2014/main" id="{B9905EF6-D1FC-4FCA-A7B1-5B5870A062BD}"/>
+                <a16:creationId xmlns:a16="http://schemas.microsoft.com/office/drawing/2014/main" xmlns="" id="{B9905EF6-D1FC-4FCA-A7B1-5B5870A062BD}"/>
               </a:ext>
             </a:extLst>
           </p:cNvPr>
@@ -9582,7 +9811,7 @@
           <p:cNvPr id="8" name="TextBox 7">
             <a:extLst>
               <a:ext uri="{FF2B5EF4-FFF2-40B4-BE49-F238E27FC236}">
-                <a16:creationId xmlns:a16="http://schemas.microsoft.com/office/drawing/2014/main" id="{406D98E7-C0D8-4184-BE1D-EC2B691542AF}"/>
+                <a16:creationId xmlns:a16="http://schemas.microsoft.com/office/drawing/2014/main" xmlns="" id="{406D98E7-C0D8-4184-BE1D-EC2B691542AF}"/>
               </a:ext>
             </a:extLst>
           </p:cNvPr>
@@ -9651,7 +9880,7 @@
           <p:cNvPr id="2" name="Title 1">
             <a:extLst>
               <a:ext uri="{FF2B5EF4-FFF2-40B4-BE49-F238E27FC236}">
-                <a16:creationId xmlns:a16="http://schemas.microsoft.com/office/drawing/2014/main" id="{741F9454-B9DB-45FD-9A0B-4395C2D7659A}"/>
+                <a16:creationId xmlns:a16="http://schemas.microsoft.com/office/drawing/2014/main" xmlns="" id="{741F9454-B9DB-45FD-9A0B-4395C2D7659A}"/>
               </a:ext>
             </a:extLst>
           </p:cNvPr>
@@ -9679,7 +9908,7 @@
           <p:cNvPr id="7" name="Picture 6">
             <a:extLst>
               <a:ext uri="{FF2B5EF4-FFF2-40B4-BE49-F238E27FC236}">
-                <a16:creationId xmlns:a16="http://schemas.microsoft.com/office/drawing/2014/main" id="{725BE065-79FB-46BF-B750-B9477AC1D9F0}"/>
+                <a16:creationId xmlns:a16="http://schemas.microsoft.com/office/drawing/2014/main" xmlns="" id="{725BE065-79FB-46BF-B750-B9477AC1D9F0}"/>
               </a:ext>
             </a:extLst>
           </p:cNvPr>
@@ -9715,7 +9944,7 @@
           <p:cNvPr id="5" name="Content Placeholder 4">
             <a:extLst>
               <a:ext uri="{FF2B5EF4-FFF2-40B4-BE49-F238E27FC236}">
-                <a16:creationId xmlns:a16="http://schemas.microsoft.com/office/drawing/2014/main" id="{AF3FEE9E-7855-4F22-93F4-B657D8C844FA}"/>
+                <a16:creationId xmlns:a16="http://schemas.microsoft.com/office/drawing/2014/main" xmlns="" id="{AF3FEE9E-7855-4F22-93F4-B657D8C844FA}"/>
               </a:ext>
             </a:extLst>
           </p:cNvPr>
@@ -9750,7 +9979,7 @@
           <p:cNvPr id="8" name="TextBox 7">
             <a:extLst>
               <a:ext uri="{FF2B5EF4-FFF2-40B4-BE49-F238E27FC236}">
-                <a16:creationId xmlns:a16="http://schemas.microsoft.com/office/drawing/2014/main" id="{BD64E5F1-7ABA-434E-984B-CBD231A754BA}"/>
+                <a16:creationId xmlns:a16="http://schemas.microsoft.com/office/drawing/2014/main" xmlns="" id="{BD64E5F1-7ABA-434E-984B-CBD231A754BA}"/>
               </a:ext>
             </a:extLst>
           </p:cNvPr>
@@ -9819,7 +10048,7 @@
           <p:cNvPr id="2" name="Title 1">
             <a:extLst>
               <a:ext uri="{FF2B5EF4-FFF2-40B4-BE49-F238E27FC236}">
-                <a16:creationId xmlns:a16="http://schemas.microsoft.com/office/drawing/2014/main" id="{4B12881A-54FE-4082-8082-7417F35AAC81}"/>
+                <a16:creationId xmlns:a16="http://schemas.microsoft.com/office/drawing/2014/main" xmlns="" id="{4B12881A-54FE-4082-8082-7417F35AAC81}"/>
               </a:ext>
             </a:extLst>
           </p:cNvPr>
@@ -9879,110 +10108,285 @@
       </p:grpSpPr>
       <p:sp>
         <p:nvSpPr>
-          <p:cNvPr id="3" name="Slide Number Placeholder 2"/>
+          <p:cNvPr id="2" name="Title 1"/>
           <p:cNvSpPr>
             <a:spLocks noGrp="1"/>
           </p:cNvSpPr>
           <p:nvPr>
-            <p:ph type="sldNum" sz="quarter" idx="12"/>
-          </p:nvPr>
-        </p:nvSpPr>
-        <p:spPr>
-          <a:xfrm>
-            <a:off x="11413998" y="6475080"/>
-            <a:ext cx="329636" cy="182880"/>
-          </a:xfrm>
-        </p:spPr>
+            <p:ph type="title"/>
+          </p:nvPr>
+        </p:nvSpPr>
+        <p:spPr/>
         <p:txBody>
           <a:bodyPr/>
           <a:lstStyle/>
           <a:p>
-            <a:fld id="{00E6A5BD-C011-4A45-AA3A-201790FB7F2B}" type="slidenum">
-              <a:rPr lang="en-CA" smtClean="0"/>
-              <a:pPr/>
-              <a:t>7</a:t>
-            </a:fld>
-            <a:endParaRPr lang="en-CA"/>
-          </a:p>
-        </p:txBody>
-      </p:sp>
-      <p:sp>
-        <p:nvSpPr>
-          <p:cNvPr id="10" name="Rectangle 9">
+            <a:pPr algn="ctr"/>
+            <a:r>
+              <a:rPr lang="en-US" b="1" dirty="0" smtClean="0"/>
+              <a:t>The Sidekick</a:t>
+            </a:r>
+            <a:endParaRPr lang="en-US" b="1" dirty="0"/>
+          </a:p>
+        </p:txBody>
+      </p:sp>
+      <p:pic>
+        <p:nvPicPr>
+          <p:cNvPr id="1026" name="Picture 2" descr="ttps://pixel.nymag.com/imgs/daily/vulture/2018/07/26/26-teen-titans-go-1.w700.h467.jpg"/>
+          <p:cNvPicPr>
+            <a:picLocks noGrp="1" noChangeAspect="1" noChangeArrowheads="1"/>
+          </p:cNvPicPr>
+          <p:nvPr>
+            <p:ph idx="1"/>
+          </p:nvPr>
+        </p:nvPicPr>
+        <p:blipFill>
+          <a:blip r:embed="rId3">
             <a:extLst>
-              <a:ext uri="{FF2B5EF4-FFF2-40B4-BE49-F238E27FC236}">
-                <a16:creationId xmlns:a16="http://schemas.microsoft.com/office/drawing/2014/main" id="{0B067B62-D23E-864B-9E5B-4D924BB9B5A2}"/>
+              <a:ext uri="{28A0092B-C50C-407E-A947-70E740481C1C}">
+                <a14:useLocalDpi xmlns:a14="http://schemas.microsoft.com/office/drawing/2010/main" val="0"/>
               </a:ext>
             </a:extLst>
-          </p:cNvPr>
-          <p:cNvSpPr/>
-          <p:nvPr/>
-        </p:nvSpPr>
-        <p:spPr>
+          </a:blip>
+          <a:srcRect/>
+          <a:stretch>
+            <a:fillRect/>
+          </a:stretch>
+        </p:blipFill>
+        <p:spPr bwMode="auto">
           <a:xfrm>
-            <a:off x="533767" y="863269"/>
-            <a:ext cx="11209867" cy="5016758"/>
+            <a:off x="365994" y="1398076"/>
+            <a:ext cx="5213148" cy="3477914"/>
           </a:xfrm>
           <a:prstGeom prst="rect">
             <a:avLst/>
           </a:prstGeom>
+          <a:noFill/>
+          <a:extLst>
+            <a:ext uri="{909E8E84-426E-40DD-AFC4-6F175D3DCCD1}">
+              <a14:hiddenFill xmlns:a14="http://schemas.microsoft.com/office/drawing/2010/main">
+                <a:solidFill>
+                  <a:srgbClr val="FFFFFF"/>
+                </a:solidFill>
+              </a14:hiddenFill>
+            </a:ext>
+          </a:extLst>
         </p:spPr>
-        <p:txBody>
-          <a:bodyPr wrap="square">
+      </p:pic>
+      <p:sp>
+        <p:nvSpPr>
+          <p:cNvPr id="6" name="TextBox 5"/>
+          <p:cNvSpPr txBox="1"/>
+          <p:nvPr/>
+        </p:nvSpPr>
+        <p:spPr>
+          <a:xfrm>
+            <a:off x="5849579" y="1388342"/>
+            <a:ext cx="6166391" cy="4001095"/>
+          </a:xfrm>
+          <a:prstGeom prst="rect">
+            <a:avLst/>
+          </a:prstGeom>
+          <a:noFill/>
+        </p:spPr>
+        <p:txBody>
+          <a:bodyPr wrap="square" lIns="0" tIns="0" rIns="0" bIns="0" rtlCol="0">
             <a:spAutoFit/>
           </a:bodyPr>
           <a:lstStyle/>
           <a:p>
             <a:r>
-              <a:rPr lang="en-US" sz="4000" dirty="0" err="1"/>
-              <a:t>git</a:t>
-            </a:r>
-            <a:r>
-              <a:rPr lang="en-US" sz="4000" dirty="0"/>
-              <a:t> clone </a:t>
-            </a:r>
-            <a:r>
-              <a:rPr lang="en-US" sz="4000" dirty="0">
-                <a:hlinkClick r:id="rId2"/>
+              <a:rPr lang="en-US" sz="2600" dirty="0" smtClean="0">
+                <a:solidFill>
+                  <a:schemeClr val="accent2"/>
+                </a:solidFill>
               </a:rPr>
-              <a:t>https://github.com/pilotdeveloper/sensors_lab.git</a:t>
-            </a:r>
-            <a:endParaRPr lang="en-US" sz="4000" dirty="0"/>
-          </a:p>
-          <a:p>
-            <a:endParaRPr lang="en-US" sz="4000" dirty="0"/>
-          </a:p>
-          <a:p>
-            <a:r>
-              <a:rPr lang="en-US" sz="4000" dirty="0"/>
-              <a:t>Mac users:  </a:t>
-            </a:r>
-          </a:p>
-          <a:p>
-            <a:r>
-              <a:rPr lang="en-US" sz="4000" dirty="0"/>
-              <a:t>Install below and reboot </a:t>
-            </a:r>
-            <a:r>
-              <a:rPr lang="en-US" sz="4000" dirty="0">
-                <a:hlinkClick r:id="rId3"/>
+              <a:t>Abhinav Reddy</a:t>
+            </a:r>
+          </a:p>
+          <a:p>
+            <a:endParaRPr lang="en-US" sz="2600" dirty="0" smtClean="0">
+              <a:solidFill>
+                <a:schemeClr val="accent2"/>
+              </a:solidFill>
+            </a:endParaRPr>
+          </a:p>
+          <a:p>
+            <a:r>
+              <a:rPr lang="en-US" sz="2600" dirty="0" smtClean="0">
+                <a:solidFill>
+                  <a:schemeClr val="accent1"/>
+                </a:solidFill>
               </a:rPr>
-              <a:t>http://www.ftdichip.com/Drivers/VCP/MacOSX/FTDIUSBSerialDriver_v2_4_2.dmg</a:t>
-            </a:r>
-            <a:r>
-              <a:rPr lang="en-US" sz="4000" dirty="0"/>
+              <a:t>GSU</a:t>
+            </a:r>
+            <a:r>
+              <a:rPr lang="en-US" sz="2600" dirty="0" smtClean="0">
+                <a:solidFill>
+                  <a:schemeClr val="accent2"/>
+                </a:solidFill>
+              </a:rPr>
               <a:t> </a:t>
             </a:r>
-          </a:p>
-          <a:p>
-            <a:endParaRPr lang="en-US" sz="4000" dirty="0"/>
+            <a:r>
+              <a:rPr lang="en-US" sz="2600" dirty="0" smtClean="0"/>
+              <a:t>Alumni!</a:t>
+            </a:r>
+          </a:p>
+          <a:p>
+            <a:r>
+              <a:rPr lang="en-US" sz="2600" dirty="0">
+                <a:solidFill>
+                  <a:schemeClr val="accent2"/>
+                </a:solidFill>
+              </a:rPr>
+              <a:t> </a:t>
+            </a:r>
+            <a:r>
+              <a:rPr lang="en-US" sz="2600" dirty="0" smtClean="0">
+                <a:solidFill>
+                  <a:schemeClr val="accent2"/>
+                </a:solidFill>
+              </a:rPr>
+              <a:t>   - Graduated Summer 2017</a:t>
+            </a:r>
+          </a:p>
+          <a:p>
+            <a:r>
+              <a:rPr lang="en-US" sz="2600" dirty="0" smtClean="0"/>
+              <a:t>GE </a:t>
+            </a:r>
+            <a:r>
+              <a:rPr lang="en-US" sz="2600" dirty="0" smtClean="0">
+                <a:solidFill>
+                  <a:schemeClr val="accent6"/>
+                </a:solidFill>
+              </a:rPr>
+              <a:t>Software Engineer</a:t>
+            </a:r>
+          </a:p>
+          <a:p>
+            <a:r>
+              <a:rPr lang="en-US" sz="2600" dirty="0">
+                <a:solidFill>
+                  <a:schemeClr val="accent2"/>
+                </a:solidFill>
+              </a:rPr>
+              <a:t> </a:t>
+            </a:r>
+            <a:r>
+              <a:rPr lang="en-US" sz="2600" dirty="0" smtClean="0">
+                <a:solidFill>
+                  <a:schemeClr val="accent2"/>
+                </a:solidFill>
+              </a:rPr>
+              <a:t>   - Summer 2017-Present</a:t>
+            </a:r>
+            <a:endParaRPr lang="en-US" sz="2600" dirty="0">
+              <a:solidFill>
+                <a:schemeClr val="accent2"/>
+              </a:solidFill>
+            </a:endParaRPr>
+          </a:p>
+          <a:p>
+            <a:r>
+              <a:rPr lang="en-US" sz="2600" dirty="0" smtClean="0">
+                <a:solidFill>
+                  <a:schemeClr val="accent2"/>
+                </a:solidFill>
+              </a:rPr>
+              <a:t>Once wrote a </a:t>
+            </a:r>
+            <a:r>
+              <a:rPr lang="en-US" sz="2600" dirty="0" smtClean="0">
+                <a:solidFill>
+                  <a:srgbClr val="FFC000"/>
+                </a:solidFill>
+              </a:rPr>
+              <a:t>cryptocurrency</a:t>
+            </a:r>
+            <a:r>
+              <a:rPr lang="en-US" sz="2600" dirty="0" smtClean="0">
+                <a:solidFill>
+                  <a:schemeClr val="accent2"/>
+                </a:solidFill>
+              </a:rPr>
+              <a:t> trading bot</a:t>
+            </a:r>
+          </a:p>
+          <a:p>
+            <a:r>
+              <a:rPr lang="en-US" sz="2600" dirty="0" smtClean="0">
+                <a:solidFill>
+                  <a:schemeClr val="accent2"/>
+                </a:solidFill>
+              </a:rPr>
+              <a:t>    - Only lost </a:t>
+            </a:r>
+            <a:r>
+              <a:rPr lang="en-US" sz="2600" dirty="0" smtClean="0">
+                <a:solidFill>
+                  <a:srgbClr val="FF0000"/>
+                </a:solidFill>
+              </a:rPr>
+              <a:t>$80</a:t>
+            </a:r>
+            <a:r>
+              <a:rPr lang="en-US" sz="2600" dirty="0" smtClean="0">
+                <a:solidFill>
+                  <a:schemeClr val="accent2"/>
+                </a:solidFill>
+              </a:rPr>
+              <a:t>  :D</a:t>
+            </a:r>
+            <a:endParaRPr lang="en-US" sz="2600" dirty="0">
+              <a:solidFill>
+                <a:schemeClr val="accent2"/>
+              </a:solidFill>
+            </a:endParaRPr>
+          </a:p>
+          <a:p>
+            <a:r>
+              <a:rPr lang="en-US" sz="2600" dirty="0" smtClean="0">
+                <a:solidFill>
+                  <a:schemeClr val="accent2"/>
+                </a:solidFill>
+              </a:rPr>
+              <a:t>Currently working on a news aggregator</a:t>
+            </a:r>
+          </a:p>
+          <a:p>
+            <a:r>
+              <a:rPr lang="en-US" sz="2600" dirty="0" smtClean="0">
+                <a:solidFill>
+                  <a:schemeClr val="accent2"/>
+                </a:solidFill>
+              </a:rPr>
+              <a:t>    - </a:t>
+            </a:r>
+            <a:r>
+              <a:rPr lang="en-US" sz="2600" dirty="0" smtClean="0">
+                <a:solidFill>
+                  <a:srgbClr val="7030A0"/>
+                </a:solidFill>
+              </a:rPr>
+              <a:t>everything.news </a:t>
+            </a:r>
+            <a:r>
+              <a:rPr lang="en-US" sz="2600" dirty="0" smtClean="0">
+                <a:solidFill>
+                  <a:schemeClr val="accent4"/>
+                </a:solidFill>
+              </a:rPr>
+              <a:t>(migration imminent)</a:t>
+            </a:r>
           </a:p>
         </p:txBody>
       </p:sp>
     </p:spTree>
     <p:extLst>
       <p:ext uri="{BB962C8B-B14F-4D97-AF65-F5344CB8AC3E}">
-        <p14:creationId xmlns:p14="http://schemas.microsoft.com/office/powerpoint/2010/main" val="1449033653"/>
+        <p14:creationId xmlns:p14="http://schemas.microsoft.com/office/powerpoint/2010/main" val="553624033"/>
       </p:ext>
     </p:extLst>
   </p:cSld>
@@ -10011,102 +10415,110 @@
       </p:grpSpPr>
       <p:sp>
         <p:nvSpPr>
-          <p:cNvPr id="2" name="Title 1"/>
+          <p:cNvPr id="3" name="Slide Number Placeholder 2"/>
           <p:cNvSpPr>
             <a:spLocks noGrp="1"/>
           </p:cNvSpPr>
           <p:nvPr>
-            <p:ph type="title"/>
-          </p:nvPr>
-        </p:nvSpPr>
-        <p:spPr/>
+            <p:ph type="sldNum" sz="quarter" idx="12"/>
+          </p:nvPr>
+        </p:nvSpPr>
+        <p:spPr>
+          <a:xfrm>
+            <a:off x="11413998" y="6475080"/>
+            <a:ext cx="329636" cy="182880"/>
+          </a:xfrm>
+        </p:spPr>
         <p:txBody>
           <a:bodyPr/>
           <a:lstStyle/>
           <a:p>
-            <a:r>
-              <a:rPr lang="en-US" dirty="0"/>
-              <a:t>Please Pick Up</a:t>
-            </a:r>
-          </a:p>
-        </p:txBody>
-      </p:sp>
-      <p:sp>
-        <p:nvSpPr>
-          <p:cNvPr id="3" name="Content Placeholder 2"/>
-          <p:cNvSpPr>
-            <a:spLocks noGrp="1"/>
-          </p:cNvSpPr>
-          <p:nvPr>
-            <p:ph idx="1"/>
-          </p:nvPr>
+            <a:fld id="{00E6A5BD-C011-4A45-AA3A-201790FB7F2B}" type="slidenum">
+              <a:rPr lang="en-CA" smtClean="0"/>
+              <a:pPr/>
+              <a:t>8</a:t>
+            </a:fld>
+            <a:endParaRPr lang="en-CA"/>
+          </a:p>
+        </p:txBody>
+      </p:sp>
+      <p:sp>
+        <p:nvSpPr>
+          <p:cNvPr id="10" name="Rectangle 9">
+            <a:extLst>
+              <a:ext uri="{FF2B5EF4-FFF2-40B4-BE49-F238E27FC236}">
+                <a16:creationId xmlns:a16="http://schemas.microsoft.com/office/drawing/2014/main" xmlns="" id="{0B067B62-D23E-864B-9E5B-4D924BB9B5A2}"/>
+              </a:ext>
+            </a:extLst>
+          </p:cNvPr>
+          <p:cNvSpPr/>
+          <p:nvPr/>
         </p:nvSpPr>
         <p:spPr>
           <a:xfrm>
-            <a:off x="533400" y="1136486"/>
-            <a:ext cx="10132616" cy="4837973"/>
+            <a:off x="533767" y="863269"/>
+            <a:ext cx="11209867" cy="5016758"/>
           </a:xfrm>
+          <a:prstGeom prst="rect">
+            <a:avLst/>
+          </a:prstGeom>
         </p:spPr>
         <p:txBody>
-          <a:bodyPr/>
+          <a:bodyPr wrap="square">
+            <a:spAutoFit/>
+          </a:bodyPr>
           <a:lstStyle/>
           <a:p>
             <a:r>
-              <a:rPr lang="en-US" sz="2400" dirty="0"/>
-              <a:t>8 male to female jumper cables</a:t>
-            </a:r>
-          </a:p>
-          <a:p>
-            <a:r>
-              <a:rPr lang="en-US" sz="2400" dirty="0"/>
-              <a:t>10 male to male jumper cables</a:t>
-            </a:r>
-          </a:p>
-          <a:p>
-            <a:r>
-              <a:rPr lang="en-US" sz="2400" dirty="0"/>
-              <a:t>10 µf electrolytic capacitor</a:t>
-            </a:r>
-          </a:p>
-          <a:p>
-            <a:r>
-              <a:rPr lang="en-US" sz="2400" dirty="0"/>
-              <a:t>1x NRF24L01+ Transceiver</a:t>
-            </a:r>
-          </a:p>
-          <a:p>
-            <a:r>
-              <a:rPr lang="en-US" sz="2400" dirty="0"/>
-              <a:t>4 tactical buttons</a:t>
-            </a:r>
-          </a:p>
-          <a:p>
-            <a:r>
-              <a:rPr lang="en-US" sz="2400" dirty="0"/>
-              <a:t>Arduino</a:t>
-            </a:r>
-          </a:p>
-          <a:p>
-            <a:r>
-              <a:rPr lang="en-US" sz="2400" dirty="0"/>
-              <a:t>Breadboard</a:t>
-            </a:r>
-          </a:p>
-          <a:p>
-            <a:r>
-              <a:rPr lang="en-US" sz="2400" dirty="0"/>
-              <a:t>USB Cable</a:t>
-            </a:r>
-          </a:p>
-          <a:p>
-            <a:endParaRPr lang="en-US" sz="2400" dirty="0"/>
+              <a:rPr lang="en-US" sz="4000" dirty="0" err="1"/>
+              <a:t>git</a:t>
+            </a:r>
+            <a:r>
+              <a:rPr lang="en-US" sz="4000" dirty="0"/>
+              <a:t> clone </a:t>
+            </a:r>
+            <a:r>
+              <a:rPr lang="en-US" sz="4000" dirty="0">
+                <a:hlinkClick r:id="rId2"/>
+              </a:rPr>
+              <a:t>https://github.com/pilotdeveloper/sensors_lab.git</a:t>
+            </a:r>
+            <a:endParaRPr lang="en-US" sz="4000" dirty="0"/>
+          </a:p>
+          <a:p>
+            <a:endParaRPr lang="en-US" sz="4000" dirty="0"/>
+          </a:p>
+          <a:p>
+            <a:r>
+              <a:rPr lang="en-US" sz="4000" dirty="0"/>
+              <a:t>Mac users:  </a:t>
+            </a:r>
+          </a:p>
+          <a:p>
+            <a:r>
+              <a:rPr lang="en-US" sz="4000" dirty="0"/>
+              <a:t>Install below and reboot </a:t>
+            </a:r>
+            <a:r>
+              <a:rPr lang="en-US" sz="4000" dirty="0">
+                <a:hlinkClick r:id="rId3"/>
+              </a:rPr>
+              <a:t>http://www.ftdichip.com/Drivers/VCP/MacOSX/FTDIUSBSerialDriver_v2_4_2.dmg</a:t>
+            </a:r>
+            <a:r>
+              <a:rPr lang="en-US" sz="4000" dirty="0"/>
+              <a:t> </a:t>
+            </a:r>
+          </a:p>
+          <a:p>
+            <a:endParaRPr lang="en-US" sz="4000" dirty="0"/>
           </a:p>
         </p:txBody>
       </p:sp>
     </p:spTree>
     <p:extLst>
       <p:ext uri="{BB962C8B-B14F-4D97-AF65-F5344CB8AC3E}">
-        <p14:creationId xmlns:p14="http://schemas.microsoft.com/office/powerpoint/2010/main" val="1350419827"/>
+        <p14:creationId xmlns:p14="http://schemas.microsoft.com/office/powerpoint/2010/main" val="1449033653"/>
       </p:ext>
     </p:extLst>
   </p:cSld>
@@ -10150,7 +10562,7 @@
           <a:p>
             <a:r>
               <a:rPr lang="en-US" dirty="0"/>
-              <a:t>Test your board</a:t>
+              <a:t>Please Pick Up</a:t>
             </a:r>
           </a:p>
         </p:txBody>
@@ -10165,84 +10577,64 @@
             <p:ph idx="1"/>
           </p:nvPr>
         </p:nvSpPr>
-        <p:spPr/>
+        <p:spPr>
+          <a:xfrm>
+            <a:off x="533400" y="1136486"/>
+            <a:ext cx="10132616" cy="4837973"/>
+          </a:xfrm>
+        </p:spPr>
         <p:txBody>
           <a:bodyPr/>
           <a:lstStyle/>
           <a:p>
             <a:r>
               <a:rPr lang="en-US" sz="2400" dirty="0"/>
-              <a:t>Open the Arduino IDE</a:t>
+              <a:t>8 male to female jumper cables</a:t>
             </a:r>
           </a:p>
           <a:p>
             <a:r>
               <a:rPr lang="en-US" sz="2400" dirty="0"/>
-              <a:t>Select Tools, Click Board -&gt; Arduino Nano</a:t>
+              <a:t>10 male to male jumper cables</a:t>
             </a:r>
           </a:p>
           <a:p>
             <a:r>
               <a:rPr lang="en-US" sz="2400" dirty="0"/>
-              <a:t>Take note of the current devices under Tools -&gt; Port (write down so you don’t select them later)</a:t>
+              <a:t>10 µf electrolytic capacitor</a:t>
             </a:r>
           </a:p>
           <a:p>
             <a:r>
               <a:rPr lang="en-US" sz="2400" dirty="0"/>
-              <a:t>Plug your Arduino in, wait about 20 seconds, and then check under Tools -&gt; Port.  </a:t>
-            </a:r>
-          </a:p>
-          <a:p>
-            <a:pPr marL="534924" lvl="3" indent="-342900"/>
-            <a:r>
-              <a:rPr lang="en-US" b="1" dirty="0"/>
-              <a:t>	</a:t>
-            </a:r>
-            <a:r>
-              <a:rPr lang="en-US" dirty="0"/>
-              <a:t>Windows – should show as a COM# device</a:t>
-            </a:r>
-          </a:p>
-          <a:p>
-            <a:pPr marL="534924" lvl="3" indent="-342900"/>
-            <a:r>
-              <a:rPr lang="en-US" dirty="0"/>
-              <a:t>	Mac Users – check the file called “</a:t>
-            </a:r>
-            <a:r>
-              <a:rPr lang="en-US" dirty="0" err="1"/>
-              <a:t>mac_help.txt</a:t>
-            </a:r>
-            <a:r>
-              <a:rPr lang="en-US" dirty="0"/>
-              <a:t>” in the repo.</a:t>
+              <a:t>1x NRF24L01+ Transceiver</a:t>
             </a:r>
           </a:p>
           <a:p>
             <a:r>
               <a:rPr lang="en-US" sz="2400" dirty="0"/>
-              <a:t>Open the file </a:t>
-            </a:r>
-            <a:r>
-              <a:rPr lang="en-US" sz="2400" dirty="0" err="1"/>
-              <a:t>helloworld</a:t>
-            </a:r>
+              <a:t>4 tactical buttons</a:t>
+            </a:r>
+          </a:p>
+          <a:p>
             <a:r>
               <a:rPr lang="en-US" sz="2400" dirty="0"/>
-              <a:t>/</a:t>
-            </a:r>
-            <a:r>
-              <a:rPr lang="en-US" sz="2400" dirty="0" err="1"/>
-              <a:t>helloworld.ino</a:t>
-            </a:r>
+              <a:t>Arduino</a:t>
+            </a:r>
+          </a:p>
+          <a:p>
             <a:r>
               <a:rPr lang="en-US" sz="2400" dirty="0"/>
-              <a:t> and click the run button in Arduino</a:t>
-            </a:r>
-          </a:p>
-          <a:p>
-            <a:pPr lvl="1"/>
+              <a:t>Breadboard</a:t>
+            </a:r>
+          </a:p>
+          <a:p>
+            <a:r>
+              <a:rPr lang="en-US" sz="2400" dirty="0"/>
+              <a:t>USB Cable</a:t>
+            </a:r>
+          </a:p>
+          <a:p>
             <a:endParaRPr lang="en-US" sz="2400" dirty="0"/>
           </a:p>
         </p:txBody>
@@ -10250,7 +10642,7 @@
     </p:spTree>
     <p:extLst>
       <p:ext uri="{BB962C8B-B14F-4D97-AF65-F5344CB8AC3E}">
-        <p14:creationId xmlns:p14="http://schemas.microsoft.com/office/powerpoint/2010/main" val="2066430322"/>
+        <p14:creationId xmlns:p14="http://schemas.microsoft.com/office/powerpoint/2010/main" val="1350419827"/>
       </p:ext>
     </p:extLst>
   </p:cSld>

</xml_diff>